<commit_message>
PR Module PP Added
</commit_message>
<xml_diff>
--- a/Presentation .pptx
+++ b/Presentation .pptx
@@ -9,6 +9,10 @@
     <p:sldId id="257" r:id="rId3"/>
     <p:sldId id="258" r:id="rId4"/>
     <p:sldId id="259" r:id="rId5"/>
+    <p:sldId id="260" r:id="rId6"/>
+    <p:sldId id="262" r:id="rId7"/>
+    <p:sldId id="261" r:id="rId8"/>
+    <p:sldId id="263" r:id="rId9"/>
   </p:sldIdLst>
   <p:sldSz cx="12192000" cy="6858000"/>
   <p:notesSz cx="6858000" cy="9144000"/>
@@ -107,6 +111,11 @@
       </a:defRPr>
     </a:lvl9pPr>
   </p:defaultTextStyle>
+  <p:extLst>
+    <p:ext uri="{EFAFB233-063F-42B5-8137-9DF3F51BA10A}">
+      <p15:sldGuideLst xmlns:p15="http://schemas.microsoft.com/office/powerpoint/2012/main"/>
+    </p:ext>
+  </p:extLst>
 </p:presentation>
 </file>
 
@@ -249,7 +258,7 @@
           <a:p>
             <a:fld id="{48A87A34-81AB-432B-8DAE-1953F412C126}" type="datetimeFigureOut">
               <a:rPr lang="en-US" dirty="0"/>
-              <a:t>4/26/18</a:t>
+              <a:t>4/29/18</a:t>
             </a:fld>
             <a:endParaRPr lang="en-US" dirty="0"/>
           </a:p>
@@ -455,7 +464,7 @@
           <a:p>
             <a:fld id="{48A87A34-81AB-432B-8DAE-1953F412C126}" type="datetimeFigureOut">
               <a:rPr lang="en-US" dirty="0"/>
-              <a:t>4/26/18</a:t>
+              <a:t>4/29/18</a:t>
             </a:fld>
             <a:endParaRPr lang="en-US" dirty="0"/>
           </a:p>
@@ -665,7 +674,7 @@
           <a:p>
             <a:fld id="{48A87A34-81AB-432B-8DAE-1953F412C126}" type="datetimeFigureOut">
               <a:rPr lang="en-US" dirty="0"/>
-              <a:t>4/26/18</a:t>
+              <a:t>4/29/18</a:t>
             </a:fld>
             <a:endParaRPr lang="en-US" dirty="0"/>
           </a:p>
@@ -861,7 +870,7 @@
           <a:p>
             <a:fld id="{48A87A34-81AB-432B-8DAE-1953F412C126}" type="datetimeFigureOut">
               <a:rPr lang="en-US" dirty="0"/>
-              <a:t>4/26/18</a:t>
+              <a:t>4/29/18</a:t>
             </a:fld>
             <a:endParaRPr lang="en-US" dirty="0"/>
           </a:p>
@@ -1135,7 +1144,7 @@
           <a:p>
             <a:fld id="{48A87A34-81AB-432B-8DAE-1953F412C126}" type="datetimeFigureOut">
               <a:rPr lang="en-US" dirty="0"/>
-              <a:t>4/26/18</a:t>
+              <a:t>4/29/18</a:t>
             </a:fld>
             <a:endParaRPr lang="en-US" dirty="0"/>
           </a:p>
@@ -1398,7 +1407,7 @@
           <a:p>
             <a:fld id="{48A87A34-81AB-432B-8DAE-1953F412C126}" type="datetimeFigureOut">
               <a:rPr lang="en-US" dirty="0"/>
-              <a:t>4/26/18</a:t>
+              <a:t>4/29/18</a:t>
             </a:fld>
             <a:endParaRPr lang="en-US" dirty="0"/>
           </a:p>
@@ -1809,7 +1818,7 @@
           <a:p>
             <a:fld id="{48A87A34-81AB-432B-8DAE-1953F412C126}" type="datetimeFigureOut">
               <a:rPr lang="en-US" dirty="0"/>
-              <a:t>4/26/18</a:t>
+              <a:t>4/29/18</a:t>
             </a:fld>
             <a:endParaRPr lang="en-US" dirty="0"/>
           </a:p>
@@ -1953,7 +1962,7 @@
           <a:p>
             <a:fld id="{48A87A34-81AB-432B-8DAE-1953F412C126}" type="datetimeFigureOut">
               <a:rPr lang="en-US" dirty="0"/>
-              <a:t>4/26/18</a:t>
+              <a:t>4/29/18</a:t>
             </a:fld>
             <a:endParaRPr lang="en-US" dirty="0"/>
           </a:p>
@@ -2074,7 +2083,7 @@
           <a:p>
             <a:fld id="{48A87A34-81AB-432B-8DAE-1953F412C126}" type="datetimeFigureOut">
               <a:rPr lang="en-US" dirty="0"/>
-              <a:t>4/26/18</a:t>
+              <a:t>4/29/18</a:t>
             </a:fld>
             <a:endParaRPr lang="en-US" dirty="0"/>
           </a:p>
@@ -2320,7 +2329,7 @@
           <a:p>
             <a:fld id="{48A87A34-81AB-432B-8DAE-1953F412C126}" type="datetimeFigureOut">
               <a:rPr lang="en-US" dirty="0"/>
-              <a:t>4/26/18</a:t>
+              <a:t>4/29/18</a:t>
             </a:fld>
             <a:endParaRPr lang="en-US" dirty="0"/>
           </a:p>
@@ -2761,7 +2770,7 @@
             <a:fld id="{48A87A34-81AB-432B-8DAE-1953F412C126}" type="datetimeFigureOut">
               <a:rPr lang="en-US" dirty="0"/>
               <a:pPr/>
-              <a:t>4/26/18</a:t>
+              <a:t>4/29/18</a:t>
             </a:fld>
             <a:endParaRPr lang="en-US" dirty="0"/>
           </a:p>
@@ -3083,7 +3092,7 @@
             <a:fld id="{48A87A34-81AB-432B-8DAE-1953F412C126}" type="datetimeFigureOut">
               <a:rPr lang="en-US" dirty="0"/>
               <a:pPr/>
-              <a:t>4/26/18</a:t>
+              <a:t>4/29/18</a:t>
             </a:fld>
             <a:endParaRPr lang="en-US" dirty="0"/>
           </a:p>
@@ -5201,6 +5210,2470 @@
 </p:sld>
 </file>
 
+<file path=ppt/slides/slide5.xml><?xml version="1.0" encoding="utf-8"?>
+<p:sld xmlns:a="http://schemas.openxmlformats.org/drawingml/2006/main" xmlns:r="http://schemas.openxmlformats.org/officeDocument/2006/relationships" xmlns:p="http://schemas.openxmlformats.org/presentationml/2006/main">
+  <p:cSld>
+    <p:bg>
+      <p:bgPr>
+        <a:gradFill rotWithShape="1">
+          <a:gsLst>
+            <a:gs pos="0">
+              <a:schemeClr val="bg2">
+                <a:tint val="94000"/>
+                <a:satMod val="80000"/>
+                <a:lumMod val="106000"/>
+              </a:schemeClr>
+            </a:gs>
+            <a:gs pos="100000">
+              <a:schemeClr val="bg2">
+                <a:shade val="80000"/>
+              </a:schemeClr>
+            </a:gs>
+          </a:gsLst>
+          <a:path path="circle">
+            <a:fillToRect l="43000" r="43000" b="100000"/>
+          </a:path>
+        </a:gradFill>
+        <a:effectLst/>
+      </p:bgPr>
+    </p:bg>
+    <p:spTree>
+      <p:nvGrpSpPr>
+        <p:cNvPr id="1" name=""/>
+        <p:cNvGrpSpPr/>
+        <p:nvPr/>
+      </p:nvGrpSpPr>
+      <p:grpSpPr>
+        <a:xfrm>
+          <a:off x="0" y="0"/>
+          <a:ext cx="0" cy="0"/>
+          <a:chOff x="0" y="0"/>
+          <a:chExt cx="0" cy="0"/>
+        </a:xfrm>
+      </p:grpSpPr>
+      <p:sp>
+        <p:nvSpPr>
+          <p:cNvPr id="12" name="Rectangle 11">
+            <a:extLst>
+              <a:ext uri="{FF2B5EF4-FFF2-40B4-BE49-F238E27FC236}">
+                <a16:creationId xmlns:a16="http://schemas.microsoft.com/office/drawing/2014/main" id="{EEA869E1-F851-4A52-92F5-77E592B76A5B}"/>
+              </a:ext>
+            </a:extLst>
+          </p:cNvPr>
+          <p:cNvSpPr>
+            <a:spLocks noGrp="1" noRot="1" noChangeAspect="1" noMove="1" noResize="1" noEditPoints="1" noAdjustHandles="1" noChangeArrowheads="1" noChangeShapeType="1" noTextEdit="1"/>
+          </p:cNvSpPr>
+          <p:nvPr>
+            <p:extLst>
+              <p:ext uri="{386F3935-93C4-4BCD-93E2-E3B085C9AB24}">
+                <p16:designElem xmlns:p16="http://schemas.microsoft.com/office/powerpoint/2015/main" val="1"/>
+              </p:ext>
+            </p:extLst>
+          </p:nvPr>
+        </p:nvSpPr>
+        <p:spPr>
+          <a:xfrm>
+            <a:off x="0" y="2019476"/>
+            <a:ext cx="12192000" cy="4105941"/>
+          </a:xfrm>
+          <a:prstGeom prst="rect">
+            <a:avLst/>
+          </a:prstGeom>
+          <a:gradFill flip="none" rotWithShape="1">
+            <a:gsLst>
+              <a:gs pos="0">
+                <a:schemeClr val="bg2">
+                  <a:alpha val="0"/>
+                </a:schemeClr>
+              </a:gs>
+              <a:gs pos="100000">
+                <a:schemeClr val="bg2"/>
+              </a:gs>
+            </a:gsLst>
+            <a:lin ang="5400000" scaled="0"/>
+            <a:tileRect/>
+          </a:gradFill>
+          <a:ln>
+            <a:noFill/>
+          </a:ln>
+        </p:spPr>
+        <p:style>
+          <a:lnRef idx="2">
+            <a:schemeClr val="accent1">
+              <a:shade val="50000"/>
+            </a:schemeClr>
+          </a:lnRef>
+          <a:fillRef idx="1">
+            <a:schemeClr val="accent1"/>
+          </a:fillRef>
+          <a:effectRef idx="0">
+            <a:schemeClr val="accent1"/>
+          </a:effectRef>
+          <a:fontRef idx="minor">
+            <a:schemeClr val="lt1"/>
+          </a:fontRef>
+        </p:style>
+      </p:sp>
+      <p:pic>
+        <p:nvPicPr>
+          <p:cNvPr id="14" name="Picture 13">
+            <a:extLst>
+              <a:ext uri="{FF2B5EF4-FFF2-40B4-BE49-F238E27FC236}">
+                <a16:creationId xmlns:a16="http://schemas.microsoft.com/office/drawing/2014/main" id="{B083AD55-8296-44BD-8E14-DD2DDBC351B0}"/>
+              </a:ext>
+            </a:extLst>
+          </p:cNvPr>
+          <p:cNvPicPr>
+            <a:picLocks noGrp="1" noRot="1" noChangeAspect="1" noMove="1" noResize="1" noEditPoints="1" noAdjustHandles="1" noChangeArrowheads="1" noChangeShapeType="1" noCrop="1"/>
+          </p:cNvPicPr>
+          <p:nvPr>
+            <p:extLst>
+              <p:ext uri="{386F3935-93C4-4BCD-93E2-E3B085C9AB24}">
+                <p16:designElem xmlns:p16="http://schemas.microsoft.com/office/powerpoint/2015/main" val="1"/>
+              </p:ext>
+            </p:extLst>
+          </p:nvPr>
+        </p:nvPicPr>
+        <p:blipFill rotWithShape="1">
+          <a:blip r:embed="rId2">
+            <a:extLst>
+              <a:ext uri="{28A0092B-C50C-407E-A947-70E740481C1C}">
+                <a14:useLocalDpi xmlns:a14="http://schemas.microsoft.com/office/drawing/2010/main" val="0"/>
+              </a:ext>
+            </a:extLst>
+          </a:blip>
+          <a:srcRect t="1538" b="-1538"/>
+          <a:stretch/>
+        </p:blipFill>
+        <p:spPr bwMode="black">
+          <a:xfrm>
+            <a:off x="0" y="6126480"/>
+            <a:ext cx="12192000" cy="742950"/>
+          </a:xfrm>
+          <a:prstGeom prst="rect">
+            <a:avLst/>
+          </a:prstGeom>
+        </p:spPr>
+      </p:pic>
+      <p:cxnSp>
+        <p:nvCxnSpPr>
+          <p:cNvPr id="16" name="Straight Connector 15">
+            <a:extLst>
+              <a:ext uri="{FF2B5EF4-FFF2-40B4-BE49-F238E27FC236}">
+                <a16:creationId xmlns:a16="http://schemas.microsoft.com/office/drawing/2014/main" id="{2BF46B26-15FC-4C5A-94FA-AE9ED64B5C20}"/>
+              </a:ext>
+            </a:extLst>
+          </p:cNvPr>
+          <p:cNvCxnSpPr>
+            <a:cxnSpLocks noGrp="1" noRot="1" noChangeAspect="1" noMove="1" noResize="1" noEditPoints="1" noAdjustHandles="1" noChangeArrowheads="1" noChangeShapeType="1"/>
+          </p:cNvCxnSpPr>
+          <p:nvPr>
+            <p:extLst>
+              <p:ext uri="{386F3935-93C4-4BCD-93E2-E3B085C9AB24}">
+                <p16:designElem xmlns:p16="http://schemas.microsoft.com/office/powerpoint/2015/main" val="1"/>
+              </p:ext>
+            </p:extLst>
+          </p:nvPr>
+        </p:nvCxnSpPr>
+        <p:spPr>
+          <a:xfrm>
+            <a:off x="0" y="6128413"/>
+            <a:ext cx="12192000" cy="0"/>
+          </a:xfrm>
+          <a:prstGeom prst="line">
+            <a:avLst/>
+          </a:prstGeom>
+          <a:ln w="12700">
+            <a:solidFill>
+              <a:srgbClr val="000001">
+                <a:alpha val="20000"/>
+              </a:srgbClr>
+            </a:solidFill>
+          </a:ln>
+        </p:spPr>
+        <p:style>
+          <a:lnRef idx="1">
+            <a:schemeClr val="accent1"/>
+          </a:lnRef>
+          <a:fillRef idx="0">
+            <a:schemeClr val="accent1"/>
+          </a:fillRef>
+          <a:effectRef idx="0">
+            <a:schemeClr val="accent1"/>
+          </a:effectRef>
+          <a:fontRef idx="minor">
+            <a:schemeClr val="tx1"/>
+          </a:fontRef>
+        </p:style>
+      </p:cxnSp>
+      <p:cxnSp>
+        <p:nvCxnSpPr>
+          <p:cNvPr id="18" name="Straight Connector 17">
+            <a:extLst>
+              <a:ext uri="{FF2B5EF4-FFF2-40B4-BE49-F238E27FC236}">
+                <a16:creationId xmlns:a16="http://schemas.microsoft.com/office/drawing/2014/main" id="{912F6065-5345-44BD-B66E-5487CCD7A9B9}"/>
+              </a:ext>
+            </a:extLst>
+          </p:cNvPr>
+          <p:cNvCxnSpPr>
+            <a:cxnSpLocks noGrp="1" noRot="1" noChangeAspect="1" noMove="1" noResize="1" noEditPoints="1" noAdjustHandles="1" noChangeArrowheads="1" noChangeShapeType="1"/>
+          </p:cNvCxnSpPr>
+          <p:nvPr>
+            <p:extLst>
+              <p:ext uri="{386F3935-93C4-4BCD-93E2-E3B085C9AB24}">
+                <p16:designElem xmlns:p16="http://schemas.microsoft.com/office/powerpoint/2015/main" val="1"/>
+              </p:ext>
+            </p:extLst>
+          </p:nvPr>
+        </p:nvCxnSpPr>
+        <p:spPr>
+          <a:xfrm>
+            <a:off x="2417780" y="3528542"/>
+            <a:ext cx="8637072" cy="0"/>
+          </a:xfrm>
+          <a:prstGeom prst="line">
+            <a:avLst/>
+          </a:prstGeom>
+          <a:ln w="31750"/>
+        </p:spPr>
+        <p:style>
+          <a:lnRef idx="3">
+            <a:schemeClr val="accent1"/>
+          </a:lnRef>
+          <a:fillRef idx="0">
+            <a:schemeClr val="accent1"/>
+          </a:fillRef>
+          <a:effectRef idx="2">
+            <a:schemeClr val="accent1"/>
+          </a:effectRef>
+          <a:fontRef idx="minor">
+            <a:schemeClr val="tx1"/>
+          </a:fontRef>
+        </p:style>
+      </p:cxnSp>
+      <p:sp useBgFill="1">
+        <p:nvSpPr>
+          <p:cNvPr id="20" name="Rectangle 19">
+            <a:extLst>
+              <a:ext uri="{FF2B5EF4-FFF2-40B4-BE49-F238E27FC236}">
+                <a16:creationId xmlns:a16="http://schemas.microsoft.com/office/drawing/2014/main" id="{E7ABCFA2-55B0-438C-A39A-637FFC6246E8}"/>
+              </a:ext>
+            </a:extLst>
+          </p:cNvPr>
+          <p:cNvSpPr>
+            <a:spLocks noGrp="1" noRot="1" noChangeAspect="1" noMove="1" noResize="1" noEditPoints="1" noAdjustHandles="1" noChangeArrowheads="1" noChangeShapeType="1" noTextEdit="1"/>
+          </p:cNvSpPr>
+          <p:nvPr>
+            <p:extLst>
+              <p:ext uri="{386F3935-93C4-4BCD-93E2-E3B085C9AB24}">
+                <p16:designElem xmlns:p16="http://schemas.microsoft.com/office/powerpoint/2015/main" val="1"/>
+              </p:ext>
+            </p:extLst>
+          </p:nvPr>
+        </p:nvSpPr>
+        <p:spPr>
+          <a:xfrm>
+            <a:off x="2" y="0"/>
+            <a:ext cx="12191695" cy="6858000"/>
+          </a:xfrm>
+          <a:prstGeom prst="rect">
+            <a:avLst/>
+          </a:prstGeom>
+          <a:ln>
+            <a:noFill/>
+          </a:ln>
+        </p:spPr>
+        <p:style>
+          <a:lnRef idx="2">
+            <a:schemeClr val="accent1">
+              <a:shade val="50000"/>
+            </a:schemeClr>
+          </a:lnRef>
+          <a:fillRef idx="1">
+            <a:schemeClr val="accent1"/>
+          </a:fillRef>
+          <a:effectRef idx="0">
+            <a:schemeClr val="accent1"/>
+          </a:effectRef>
+          <a:fontRef idx="minor">
+            <a:schemeClr val="lt1"/>
+          </a:fontRef>
+        </p:style>
+        <p:txBody>
+          <a:bodyPr rtlCol="0" anchor="ctr"/>
+          <a:lstStyle/>
+          <a:p>
+            <a:pPr algn="ctr"/>
+            <a:endParaRPr lang="en-US"/>
+          </a:p>
+        </p:txBody>
+      </p:sp>
+      <p:sp>
+        <p:nvSpPr>
+          <p:cNvPr id="22" name="Rectangle 21">
+            <a:extLst>
+              <a:ext uri="{FF2B5EF4-FFF2-40B4-BE49-F238E27FC236}">
+                <a16:creationId xmlns:a16="http://schemas.microsoft.com/office/drawing/2014/main" id="{1BD2C934-710E-4E0E-9ED4-03F07E019205}"/>
+              </a:ext>
+            </a:extLst>
+          </p:cNvPr>
+          <p:cNvSpPr>
+            <a:spLocks noGrp="1" noRot="1" noChangeAspect="1" noMove="1" noResize="1" noEditPoints="1" noAdjustHandles="1" noChangeArrowheads="1" noChangeShapeType="1" noTextEdit="1"/>
+          </p:cNvSpPr>
+          <p:nvPr>
+            <p:extLst>
+              <p:ext uri="{386F3935-93C4-4BCD-93E2-E3B085C9AB24}">
+                <p16:designElem xmlns:p16="http://schemas.microsoft.com/office/powerpoint/2015/main" val="1"/>
+              </p:ext>
+            </p:extLst>
+          </p:nvPr>
+        </p:nvSpPr>
+        <p:spPr>
+          <a:xfrm>
+            <a:off x="0" y="2019476"/>
+            <a:ext cx="12192000" cy="4105941"/>
+          </a:xfrm>
+          <a:prstGeom prst="rect">
+            <a:avLst/>
+          </a:prstGeom>
+          <a:gradFill flip="none" rotWithShape="1">
+            <a:gsLst>
+              <a:gs pos="0">
+                <a:schemeClr val="bg2">
+                  <a:alpha val="0"/>
+                </a:schemeClr>
+              </a:gs>
+              <a:gs pos="100000">
+                <a:schemeClr val="bg2"/>
+              </a:gs>
+            </a:gsLst>
+            <a:lin ang="5400000" scaled="0"/>
+            <a:tileRect/>
+          </a:gradFill>
+          <a:ln>
+            <a:noFill/>
+          </a:ln>
+        </p:spPr>
+        <p:style>
+          <a:lnRef idx="2">
+            <a:schemeClr val="accent1">
+              <a:shade val="50000"/>
+            </a:schemeClr>
+          </a:lnRef>
+          <a:fillRef idx="1">
+            <a:schemeClr val="accent1"/>
+          </a:fillRef>
+          <a:effectRef idx="0">
+            <a:schemeClr val="accent1"/>
+          </a:effectRef>
+          <a:fontRef idx="minor">
+            <a:schemeClr val="lt1"/>
+          </a:fontRef>
+        </p:style>
+        <p:txBody>
+          <a:bodyPr rtlCol="0" anchor="ctr"/>
+          <a:lstStyle/>
+          <a:p>
+            <a:pPr lvl="0" algn="ctr"/>
+            <a:endParaRPr lang="en-US"/>
+          </a:p>
+        </p:txBody>
+      </p:sp>
+      <p:pic>
+        <p:nvPicPr>
+          <p:cNvPr id="24" name="Picture 23">
+            <a:extLst>
+              <a:ext uri="{FF2B5EF4-FFF2-40B4-BE49-F238E27FC236}">
+                <a16:creationId xmlns:a16="http://schemas.microsoft.com/office/drawing/2014/main" id="{B0A40572-62E5-460B-AD24-B6628527ACB1}"/>
+              </a:ext>
+            </a:extLst>
+          </p:cNvPr>
+          <p:cNvPicPr>
+            <a:picLocks noGrp="1" noRot="1" noChangeAspect="1" noMove="1" noResize="1" noEditPoints="1" noAdjustHandles="1" noChangeArrowheads="1" noChangeShapeType="1" noCrop="1"/>
+          </p:cNvPicPr>
+          <p:nvPr>
+            <p:extLst>
+              <p:ext uri="{386F3935-93C4-4BCD-93E2-E3B085C9AB24}">
+                <p16:designElem xmlns:p16="http://schemas.microsoft.com/office/powerpoint/2015/main" val="1"/>
+              </p:ext>
+            </p:extLst>
+          </p:nvPr>
+        </p:nvPicPr>
+        <p:blipFill rotWithShape="1">
+          <a:blip r:embed="rId2">
+            <a:extLst>
+              <a:ext uri="{28A0092B-C50C-407E-A947-70E740481C1C}">
+                <a14:useLocalDpi xmlns:a14="http://schemas.microsoft.com/office/drawing/2010/main" val="0"/>
+              </a:ext>
+            </a:extLst>
+          </a:blip>
+          <a:srcRect t="1538" b="-1538"/>
+          <a:stretch/>
+        </p:blipFill>
+        <p:spPr bwMode="black">
+          <a:xfrm>
+            <a:off x="0" y="6126480"/>
+            <a:ext cx="12192000" cy="742950"/>
+          </a:xfrm>
+          <a:prstGeom prst="rect">
+            <a:avLst/>
+          </a:prstGeom>
+        </p:spPr>
+      </p:pic>
+      <p:cxnSp>
+        <p:nvCxnSpPr>
+          <p:cNvPr id="26" name="Straight Connector 25">
+            <a:extLst>
+              <a:ext uri="{FF2B5EF4-FFF2-40B4-BE49-F238E27FC236}">
+                <a16:creationId xmlns:a16="http://schemas.microsoft.com/office/drawing/2014/main" id="{F1D872D4-D7E5-4CD8-9DAC-2BC612F08E69}"/>
+              </a:ext>
+            </a:extLst>
+          </p:cNvPr>
+          <p:cNvCxnSpPr>
+            <a:cxnSpLocks noGrp="1" noRot="1" noChangeAspect="1" noMove="1" noResize="1" noEditPoints="1" noAdjustHandles="1" noChangeArrowheads="1" noChangeShapeType="1"/>
+          </p:cNvCxnSpPr>
+          <p:nvPr>
+            <p:extLst>
+              <p:ext uri="{386F3935-93C4-4BCD-93E2-E3B085C9AB24}">
+                <p16:designElem xmlns:p16="http://schemas.microsoft.com/office/powerpoint/2015/main" val="1"/>
+              </p:ext>
+            </p:extLst>
+          </p:nvPr>
+        </p:nvCxnSpPr>
+        <p:spPr>
+          <a:xfrm>
+            <a:off x="0" y="6128413"/>
+            <a:ext cx="12192000" cy="0"/>
+          </a:xfrm>
+          <a:prstGeom prst="line">
+            <a:avLst/>
+          </a:prstGeom>
+          <a:ln w="12700">
+            <a:solidFill>
+              <a:srgbClr val="000001">
+                <a:alpha val="20000"/>
+              </a:srgbClr>
+            </a:solidFill>
+          </a:ln>
+        </p:spPr>
+        <p:style>
+          <a:lnRef idx="1">
+            <a:schemeClr val="accent1"/>
+          </a:lnRef>
+          <a:fillRef idx="0">
+            <a:schemeClr val="accent1"/>
+          </a:fillRef>
+          <a:effectRef idx="0">
+            <a:schemeClr val="accent1"/>
+          </a:effectRef>
+          <a:fontRef idx="minor">
+            <a:schemeClr val="tx1"/>
+          </a:fontRef>
+        </p:style>
+      </p:cxnSp>
+      <p:cxnSp>
+        <p:nvCxnSpPr>
+          <p:cNvPr id="28" name="Straight Connector 27">
+            <a:extLst>
+              <a:ext uri="{FF2B5EF4-FFF2-40B4-BE49-F238E27FC236}">
+                <a16:creationId xmlns:a16="http://schemas.microsoft.com/office/drawing/2014/main" id="{0AD0F4F3-8F5C-421F-9FC1-DB3ED0BF61DF}"/>
+              </a:ext>
+            </a:extLst>
+          </p:cNvPr>
+          <p:cNvCxnSpPr>
+            <a:cxnSpLocks noGrp="1" noRot="1" noChangeAspect="1" noMove="1" noResize="1" noEditPoints="1" noAdjustHandles="1" noChangeArrowheads="1" noChangeShapeType="1"/>
+          </p:cNvCxnSpPr>
+          <p:nvPr>
+            <p:extLst>
+              <p:ext uri="{386F3935-93C4-4BCD-93E2-E3B085C9AB24}">
+                <p16:designElem xmlns:p16="http://schemas.microsoft.com/office/powerpoint/2015/main" val="1"/>
+              </p:ext>
+            </p:extLst>
+          </p:nvPr>
+        </p:nvCxnSpPr>
+        <p:spPr>
+          <a:xfrm>
+            <a:off x="484009" y="3526496"/>
+            <a:ext cx="3023617" cy="0"/>
+          </a:xfrm>
+          <a:prstGeom prst="line">
+            <a:avLst/>
+          </a:prstGeom>
+          <a:ln w="31750"/>
+        </p:spPr>
+        <p:style>
+          <a:lnRef idx="3">
+            <a:schemeClr val="accent1"/>
+          </a:lnRef>
+          <a:fillRef idx="0">
+            <a:schemeClr val="accent1"/>
+          </a:fillRef>
+          <a:effectRef idx="2">
+            <a:schemeClr val="accent1"/>
+          </a:effectRef>
+          <a:fontRef idx="minor">
+            <a:schemeClr val="tx1"/>
+          </a:fontRef>
+        </p:style>
+      </p:cxnSp>
+      <p:pic>
+        <p:nvPicPr>
+          <p:cNvPr id="7" name="Picture 6">
+            <a:extLst>
+              <a:ext uri="{FF2B5EF4-FFF2-40B4-BE49-F238E27FC236}">
+                <a16:creationId xmlns:a16="http://schemas.microsoft.com/office/drawing/2014/main" id="{835B4F6D-C7F7-E04A-B84D-66EAED5F7A2C}"/>
+              </a:ext>
+            </a:extLst>
+          </p:cNvPr>
+          <p:cNvPicPr>
+            <a:picLocks noChangeAspect="1"/>
+          </p:cNvPicPr>
+          <p:nvPr/>
+        </p:nvPicPr>
+        <p:blipFill>
+          <a:blip r:embed="rId3"/>
+          <a:stretch>
+            <a:fillRect/>
+          </a:stretch>
+        </p:blipFill>
+        <p:spPr>
+          <a:xfrm>
+            <a:off x="3860479" y="125674"/>
+            <a:ext cx="3966606" cy="3946772"/>
+          </a:xfrm>
+          <a:prstGeom prst="rect">
+            <a:avLst/>
+          </a:prstGeom>
+        </p:spPr>
+      </p:pic>
+      <p:pic>
+        <p:nvPicPr>
+          <p:cNvPr id="5" name="Content Placeholder 4">
+            <a:extLst>
+              <a:ext uri="{FF2B5EF4-FFF2-40B4-BE49-F238E27FC236}">
+                <a16:creationId xmlns:a16="http://schemas.microsoft.com/office/drawing/2014/main" id="{F70ECF8F-84DA-024A-9C74-F709B4A56183}"/>
+              </a:ext>
+            </a:extLst>
+          </p:cNvPr>
+          <p:cNvPicPr>
+            <a:picLocks noGrp="1" noChangeAspect="1"/>
+          </p:cNvPicPr>
+          <p:nvPr>
+            <p:ph idx="1"/>
+          </p:nvPr>
+        </p:nvPicPr>
+        <p:blipFill>
+          <a:blip r:embed="rId4"/>
+          <a:stretch>
+            <a:fillRect/>
+          </a:stretch>
+        </p:blipFill>
+        <p:spPr>
+          <a:xfrm>
+            <a:off x="8163185" y="588523"/>
+            <a:ext cx="3692411" cy="2667766"/>
+          </a:xfrm>
+          <a:prstGeom prst="rect">
+            <a:avLst/>
+          </a:prstGeom>
+        </p:spPr>
+      </p:pic>
+      <p:sp>
+        <p:nvSpPr>
+          <p:cNvPr id="2" name="Title 1">
+            <a:extLst>
+              <a:ext uri="{FF2B5EF4-FFF2-40B4-BE49-F238E27FC236}">
+                <a16:creationId xmlns:a16="http://schemas.microsoft.com/office/drawing/2014/main" id="{A535C3DB-B078-624D-BD68-188AC4399D15}"/>
+              </a:ext>
+            </a:extLst>
+          </p:cNvPr>
+          <p:cNvSpPr>
+            <a:spLocks noGrp="1"/>
+          </p:cNvSpPr>
+          <p:nvPr>
+            <p:ph type="title"/>
+          </p:nvPr>
+        </p:nvSpPr>
+        <p:spPr>
+          <a:xfrm>
+            <a:off x="485695" y="1474969"/>
+            <a:ext cx="3026558" cy="1868760"/>
+          </a:xfrm>
+        </p:spPr>
+        <p:txBody>
+          <a:bodyPr vert="horz" lIns="91440" tIns="45720" rIns="91440" bIns="0" rtlCol="0" anchor="b">
+            <a:normAutofit/>
+          </a:bodyPr>
+          <a:lstStyle/>
+          <a:p>
+            <a:r>
+              <a:rPr lang="en-US" sz="3600" dirty="0"/>
+              <a:t>Input Module</a:t>
+            </a:r>
+          </a:p>
+        </p:txBody>
+      </p:sp>
+      <p:pic>
+        <p:nvPicPr>
+          <p:cNvPr id="9" name="Picture 8">
+            <a:extLst>
+              <a:ext uri="{FF2B5EF4-FFF2-40B4-BE49-F238E27FC236}">
+                <a16:creationId xmlns:a16="http://schemas.microsoft.com/office/drawing/2014/main" id="{A28FAF0F-9258-9B44-B8D0-9B23D7A4B0B1}"/>
+              </a:ext>
+            </a:extLst>
+          </p:cNvPr>
+          <p:cNvPicPr>
+            <a:picLocks noChangeAspect="1"/>
+          </p:cNvPicPr>
+          <p:nvPr/>
+        </p:nvPicPr>
+        <p:blipFill>
+          <a:blip r:embed="rId5"/>
+          <a:stretch>
+            <a:fillRect/>
+          </a:stretch>
+        </p:blipFill>
+        <p:spPr>
+          <a:xfrm>
+            <a:off x="1779372" y="4273709"/>
+            <a:ext cx="10076223" cy="1662946"/>
+          </a:xfrm>
+          <a:prstGeom prst="rect">
+            <a:avLst/>
+          </a:prstGeom>
+        </p:spPr>
+      </p:pic>
+    </p:spTree>
+    <p:extLst>
+      <p:ext uri="{BB962C8B-B14F-4D97-AF65-F5344CB8AC3E}">
+        <p14:creationId xmlns:p14="http://schemas.microsoft.com/office/powerpoint/2010/main" val="2318861565"/>
+      </p:ext>
+    </p:extLst>
+  </p:cSld>
+  <p:clrMapOvr>
+    <a:masterClrMapping/>
+  </p:clrMapOvr>
+</p:sld>
+</file>
+
+<file path=ppt/slides/slide6.xml><?xml version="1.0" encoding="utf-8"?>
+<p:sld xmlns:a="http://schemas.openxmlformats.org/drawingml/2006/main" xmlns:r="http://schemas.openxmlformats.org/officeDocument/2006/relationships" xmlns:p="http://schemas.openxmlformats.org/presentationml/2006/main">
+  <p:cSld>
+    <p:bg>
+      <p:bgPr>
+        <a:gradFill rotWithShape="1">
+          <a:gsLst>
+            <a:gs pos="0">
+              <a:schemeClr val="bg2">
+                <a:tint val="94000"/>
+                <a:satMod val="80000"/>
+                <a:lumMod val="106000"/>
+              </a:schemeClr>
+            </a:gs>
+            <a:gs pos="100000">
+              <a:schemeClr val="bg2">
+                <a:shade val="80000"/>
+              </a:schemeClr>
+            </a:gs>
+          </a:gsLst>
+          <a:path path="circle">
+            <a:fillToRect l="43000" r="43000" b="100000"/>
+          </a:path>
+        </a:gradFill>
+        <a:effectLst/>
+      </p:bgPr>
+    </p:bg>
+    <p:spTree>
+      <p:nvGrpSpPr>
+        <p:cNvPr id="1" name=""/>
+        <p:cNvGrpSpPr/>
+        <p:nvPr/>
+      </p:nvGrpSpPr>
+      <p:grpSpPr>
+        <a:xfrm>
+          <a:off x="0" y="0"/>
+          <a:ext cx="0" cy="0"/>
+          <a:chOff x="0" y="0"/>
+          <a:chExt cx="0" cy="0"/>
+        </a:xfrm>
+      </p:grpSpPr>
+      <p:sp>
+        <p:nvSpPr>
+          <p:cNvPr id="10" name="Rectangle 9">
+            <a:extLst>
+              <a:ext uri="{FF2B5EF4-FFF2-40B4-BE49-F238E27FC236}">
+                <a16:creationId xmlns:a16="http://schemas.microsoft.com/office/drawing/2014/main" id="{0CABCAE3-64FC-4149-819F-2C1812824154}"/>
+              </a:ext>
+            </a:extLst>
+          </p:cNvPr>
+          <p:cNvSpPr>
+            <a:spLocks noGrp="1" noRot="1" noChangeAspect="1" noMove="1" noResize="1" noEditPoints="1" noAdjustHandles="1" noChangeArrowheads="1" noChangeShapeType="1" noTextEdit="1"/>
+          </p:cNvSpPr>
+          <p:nvPr>
+            <p:extLst>
+              <p:ext uri="{386F3935-93C4-4BCD-93E2-E3B085C9AB24}">
+                <p16:designElem xmlns:p16="http://schemas.microsoft.com/office/powerpoint/2015/main" val="1"/>
+              </p:ext>
+            </p:extLst>
+          </p:nvPr>
+        </p:nvSpPr>
+        <p:spPr>
+          <a:xfrm>
+            <a:off x="0" y="2019476"/>
+            <a:ext cx="12192000" cy="4105941"/>
+          </a:xfrm>
+          <a:prstGeom prst="rect">
+            <a:avLst/>
+          </a:prstGeom>
+          <a:gradFill flip="none" rotWithShape="1">
+            <a:gsLst>
+              <a:gs pos="0">
+                <a:schemeClr val="bg2">
+                  <a:alpha val="0"/>
+                </a:schemeClr>
+              </a:gs>
+              <a:gs pos="100000">
+                <a:schemeClr val="bg2"/>
+              </a:gs>
+            </a:gsLst>
+            <a:lin ang="5400000" scaled="0"/>
+            <a:tileRect/>
+          </a:gradFill>
+          <a:ln>
+            <a:noFill/>
+          </a:ln>
+        </p:spPr>
+        <p:style>
+          <a:lnRef idx="2">
+            <a:schemeClr val="accent1">
+              <a:shade val="50000"/>
+            </a:schemeClr>
+          </a:lnRef>
+          <a:fillRef idx="1">
+            <a:schemeClr val="accent1"/>
+          </a:fillRef>
+          <a:effectRef idx="0">
+            <a:schemeClr val="accent1"/>
+          </a:effectRef>
+          <a:fontRef idx="minor">
+            <a:schemeClr val="lt1"/>
+          </a:fontRef>
+        </p:style>
+      </p:sp>
+      <p:pic>
+        <p:nvPicPr>
+          <p:cNvPr id="12" name="Picture 11">
+            <a:extLst>
+              <a:ext uri="{FF2B5EF4-FFF2-40B4-BE49-F238E27FC236}">
+                <a16:creationId xmlns:a16="http://schemas.microsoft.com/office/drawing/2014/main" id="{012FDCFE-9AD2-4D8A-8CBF-B3AA37EBF6DD}"/>
+              </a:ext>
+            </a:extLst>
+          </p:cNvPr>
+          <p:cNvPicPr>
+            <a:picLocks noGrp="1" noRot="1" noChangeAspect="1" noMove="1" noResize="1" noEditPoints="1" noAdjustHandles="1" noChangeArrowheads="1" noChangeShapeType="1" noCrop="1"/>
+          </p:cNvPicPr>
+          <p:nvPr>
+            <p:extLst>
+              <p:ext uri="{386F3935-93C4-4BCD-93E2-E3B085C9AB24}">
+                <p16:designElem xmlns:p16="http://schemas.microsoft.com/office/powerpoint/2015/main" val="1"/>
+              </p:ext>
+            </p:extLst>
+          </p:nvPr>
+        </p:nvPicPr>
+        <p:blipFill rotWithShape="1">
+          <a:blip r:embed="rId2">
+            <a:extLst>
+              <a:ext uri="{28A0092B-C50C-407E-A947-70E740481C1C}">
+                <a14:useLocalDpi xmlns:a14="http://schemas.microsoft.com/office/drawing/2010/main" val="0"/>
+              </a:ext>
+            </a:extLst>
+          </a:blip>
+          <a:srcRect t="1538" b="-1538"/>
+          <a:stretch/>
+        </p:blipFill>
+        <p:spPr bwMode="black">
+          <a:xfrm>
+            <a:off x="0" y="6126480"/>
+            <a:ext cx="12192000" cy="742950"/>
+          </a:xfrm>
+          <a:prstGeom prst="rect">
+            <a:avLst/>
+          </a:prstGeom>
+        </p:spPr>
+      </p:pic>
+      <p:cxnSp>
+        <p:nvCxnSpPr>
+          <p:cNvPr id="14" name="Straight Connector 13">
+            <a:extLst>
+              <a:ext uri="{FF2B5EF4-FFF2-40B4-BE49-F238E27FC236}">
+                <a16:creationId xmlns:a16="http://schemas.microsoft.com/office/drawing/2014/main" id="{FBD463FC-4CA8-4FF4-85A3-AF9F4B98D210}"/>
+              </a:ext>
+            </a:extLst>
+          </p:cNvPr>
+          <p:cNvCxnSpPr>
+            <a:cxnSpLocks noGrp="1" noRot="1" noChangeAspect="1" noMove="1" noResize="1" noEditPoints="1" noAdjustHandles="1" noChangeArrowheads="1" noChangeShapeType="1"/>
+          </p:cNvCxnSpPr>
+          <p:nvPr>
+            <p:extLst>
+              <p:ext uri="{386F3935-93C4-4BCD-93E2-E3B085C9AB24}">
+                <p16:designElem xmlns:p16="http://schemas.microsoft.com/office/powerpoint/2015/main" val="1"/>
+              </p:ext>
+            </p:extLst>
+          </p:nvPr>
+        </p:nvCxnSpPr>
+        <p:spPr>
+          <a:xfrm>
+            <a:off x="0" y="6128413"/>
+            <a:ext cx="12192000" cy="0"/>
+          </a:xfrm>
+          <a:prstGeom prst="line">
+            <a:avLst/>
+          </a:prstGeom>
+          <a:ln w="12700">
+            <a:solidFill>
+              <a:srgbClr val="000001">
+                <a:alpha val="20000"/>
+              </a:srgbClr>
+            </a:solidFill>
+          </a:ln>
+        </p:spPr>
+        <p:style>
+          <a:lnRef idx="1">
+            <a:schemeClr val="accent1"/>
+          </a:lnRef>
+          <a:fillRef idx="0">
+            <a:schemeClr val="accent1"/>
+          </a:fillRef>
+          <a:effectRef idx="0">
+            <a:schemeClr val="accent1"/>
+          </a:effectRef>
+          <a:fontRef idx="minor">
+            <a:schemeClr val="tx1"/>
+          </a:fontRef>
+        </p:style>
+      </p:cxnSp>
+      <p:cxnSp>
+        <p:nvCxnSpPr>
+          <p:cNvPr id="16" name="Straight Connector 15">
+            <a:extLst>
+              <a:ext uri="{FF2B5EF4-FFF2-40B4-BE49-F238E27FC236}">
+                <a16:creationId xmlns:a16="http://schemas.microsoft.com/office/drawing/2014/main" id="{BECF35C3-8B44-4F4B-BD25-4C01823DB22A}"/>
+              </a:ext>
+            </a:extLst>
+          </p:cNvPr>
+          <p:cNvCxnSpPr>
+            <a:cxnSpLocks noGrp="1" noRot="1" noChangeAspect="1" noMove="1" noResize="1" noEditPoints="1" noAdjustHandles="1" noChangeArrowheads="1" noChangeShapeType="1"/>
+          </p:cNvCxnSpPr>
+          <p:nvPr>
+            <p:extLst>
+              <p:ext uri="{386F3935-93C4-4BCD-93E2-E3B085C9AB24}">
+                <p16:designElem xmlns:p16="http://schemas.microsoft.com/office/powerpoint/2015/main" val="1"/>
+              </p:ext>
+            </p:extLst>
+          </p:nvPr>
+        </p:nvCxnSpPr>
+        <p:spPr>
+          <a:xfrm>
+            <a:off x="2417780" y="3528542"/>
+            <a:ext cx="8637072" cy="0"/>
+          </a:xfrm>
+          <a:prstGeom prst="line">
+            <a:avLst/>
+          </a:prstGeom>
+          <a:ln w="31750"/>
+        </p:spPr>
+        <p:style>
+          <a:lnRef idx="3">
+            <a:schemeClr val="accent1"/>
+          </a:lnRef>
+          <a:fillRef idx="0">
+            <a:schemeClr val="accent1"/>
+          </a:fillRef>
+          <a:effectRef idx="2">
+            <a:schemeClr val="accent1"/>
+          </a:effectRef>
+          <a:fontRef idx="minor">
+            <a:schemeClr val="tx1"/>
+          </a:fontRef>
+        </p:style>
+      </p:cxnSp>
+      <p:sp useBgFill="1">
+        <p:nvSpPr>
+          <p:cNvPr id="18" name="Rectangle 17">
+            <a:extLst>
+              <a:ext uri="{FF2B5EF4-FFF2-40B4-BE49-F238E27FC236}">
+                <a16:creationId xmlns:a16="http://schemas.microsoft.com/office/drawing/2014/main" id="{D0712110-0BC1-4B31-B3BB-63B44222E87F}"/>
+              </a:ext>
+            </a:extLst>
+          </p:cNvPr>
+          <p:cNvSpPr>
+            <a:spLocks noGrp="1" noRot="1" noChangeAspect="1" noMove="1" noResize="1" noEditPoints="1" noAdjustHandles="1" noChangeArrowheads="1" noChangeShapeType="1" noTextEdit="1"/>
+          </p:cNvSpPr>
+          <p:nvPr>
+            <p:extLst>
+              <p:ext uri="{386F3935-93C4-4BCD-93E2-E3B085C9AB24}">
+                <p16:designElem xmlns:p16="http://schemas.microsoft.com/office/powerpoint/2015/main" val="1"/>
+              </p:ext>
+            </p:extLst>
+          </p:nvPr>
+        </p:nvSpPr>
+        <p:spPr>
+          <a:xfrm>
+            <a:off x="2" y="0"/>
+            <a:ext cx="12191695" cy="6858000"/>
+          </a:xfrm>
+          <a:prstGeom prst="rect">
+            <a:avLst/>
+          </a:prstGeom>
+          <a:ln>
+            <a:noFill/>
+          </a:ln>
+        </p:spPr>
+        <p:style>
+          <a:lnRef idx="2">
+            <a:schemeClr val="accent1">
+              <a:shade val="50000"/>
+            </a:schemeClr>
+          </a:lnRef>
+          <a:fillRef idx="1">
+            <a:schemeClr val="accent1"/>
+          </a:fillRef>
+          <a:effectRef idx="0">
+            <a:schemeClr val="accent1"/>
+          </a:effectRef>
+          <a:fontRef idx="minor">
+            <a:schemeClr val="lt1"/>
+          </a:fontRef>
+        </p:style>
+        <p:txBody>
+          <a:bodyPr rtlCol="0" anchor="ctr"/>
+          <a:lstStyle/>
+          <a:p>
+            <a:pPr algn="ctr"/>
+            <a:endParaRPr lang="en-US"/>
+          </a:p>
+        </p:txBody>
+      </p:sp>
+      <p:sp>
+        <p:nvSpPr>
+          <p:cNvPr id="20" name="Rectangle 19">
+            <a:extLst>
+              <a:ext uri="{FF2B5EF4-FFF2-40B4-BE49-F238E27FC236}">
+                <a16:creationId xmlns:a16="http://schemas.microsoft.com/office/drawing/2014/main" id="{4466B5F3-C053-4580-B04A-1EF949888280}"/>
+              </a:ext>
+            </a:extLst>
+          </p:cNvPr>
+          <p:cNvSpPr>
+            <a:spLocks noGrp="1" noRot="1" noChangeAspect="1" noMove="1" noResize="1" noEditPoints="1" noAdjustHandles="1" noChangeArrowheads="1" noChangeShapeType="1" noTextEdit="1"/>
+          </p:cNvSpPr>
+          <p:nvPr>
+            <p:extLst>
+              <p:ext uri="{386F3935-93C4-4BCD-93E2-E3B085C9AB24}">
+                <p16:designElem xmlns:p16="http://schemas.microsoft.com/office/powerpoint/2015/main" val="1"/>
+              </p:ext>
+            </p:extLst>
+          </p:nvPr>
+        </p:nvSpPr>
+        <p:spPr>
+          <a:xfrm>
+            <a:off x="0" y="2019476"/>
+            <a:ext cx="12192000" cy="4105941"/>
+          </a:xfrm>
+          <a:prstGeom prst="rect">
+            <a:avLst/>
+          </a:prstGeom>
+          <a:gradFill flip="none" rotWithShape="1">
+            <a:gsLst>
+              <a:gs pos="0">
+                <a:schemeClr val="bg2">
+                  <a:alpha val="0"/>
+                </a:schemeClr>
+              </a:gs>
+              <a:gs pos="100000">
+                <a:schemeClr val="bg2"/>
+              </a:gs>
+            </a:gsLst>
+            <a:lin ang="5400000" scaled="0"/>
+            <a:tileRect/>
+          </a:gradFill>
+          <a:ln>
+            <a:noFill/>
+          </a:ln>
+        </p:spPr>
+        <p:style>
+          <a:lnRef idx="2">
+            <a:schemeClr val="accent1">
+              <a:shade val="50000"/>
+            </a:schemeClr>
+          </a:lnRef>
+          <a:fillRef idx="1">
+            <a:schemeClr val="accent1"/>
+          </a:fillRef>
+          <a:effectRef idx="0">
+            <a:schemeClr val="accent1"/>
+          </a:effectRef>
+          <a:fontRef idx="minor">
+            <a:schemeClr val="lt1"/>
+          </a:fontRef>
+        </p:style>
+        <p:txBody>
+          <a:bodyPr rtlCol="0" anchor="ctr"/>
+          <a:lstStyle/>
+          <a:p>
+            <a:pPr lvl="0" algn="ctr"/>
+            <a:endParaRPr lang="en-US"/>
+          </a:p>
+        </p:txBody>
+      </p:sp>
+      <p:pic>
+        <p:nvPicPr>
+          <p:cNvPr id="22" name="Picture 21">
+            <a:extLst>
+              <a:ext uri="{FF2B5EF4-FFF2-40B4-BE49-F238E27FC236}">
+                <a16:creationId xmlns:a16="http://schemas.microsoft.com/office/drawing/2014/main" id="{25CED634-E2D0-4AB7-96DD-816C9B52C5CF}"/>
+              </a:ext>
+            </a:extLst>
+          </p:cNvPr>
+          <p:cNvPicPr>
+            <a:picLocks noGrp="1" noRot="1" noChangeAspect="1" noMove="1" noResize="1" noEditPoints="1" noAdjustHandles="1" noChangeArrowheads="1" noChangeShapeType="1" noCrop="1"/>
+          </p:cNvPicPr>
+          <p:nvPr>
+            <p:extLst>
+              <p:ext uri="{386F3935-93C4-4BCD-93E2-E3B085C9AB24}">
+                <p16:designElem xmlns:p16="http://schemas.microsoft.com/office/powerpoint/2015/main" val="1"/>
+              </p:ext>
+            </p:extLst>
+          </p:nvPr>
+        </p:nvPicPr>
+        <p:blipFill rotWithShape="1">
+          <a:blip r:embed="rId2">
+            <a:extLst>
+              <a:ext uri="{28A0092B-C50C-407E-A947-70E740481C1C}">
+                <a14:useLocalDpi xmlns:a14="http://schemas.microsoft.com/office/drawing/2010/main" val="0"/>
+              </a:ext>
+            </a:extLst>
+          </a:blip>
+          <a:srcRect t="1538" b="-1538"/>
+          <a:stretch/>
+        </p:blipFill>
+        <p:spPr bwMode="black">
+          <a:xfrm>
+            <a:off x="0" y="6126480"/>
+            <a:ext cx="12192000" cy="742950"/>
+          </a:xfrm>
+          <a:prstGeom prst="rect">
+            <a:avLst/>
+          </a:prstGeom>
+        </p:spPr>
+      </p:pic>
+      <p:cxnSp>
+        <p:nvCxnSpPr>
+          <p:cNvPr id="24" name="Straight Connector 23">
+            <a:extLst>
+              <a:ext uri="{FF2B5EF4-FFF2-40B4-BE49-F238E27FC236}">
+                <a16:creationId xmlns:a16="http://schemas.microsoft.com/office/drawing/2014/main" id="{FCDDCDFB-696D-4FDF-9B58-24F71B7C37BC}"/>
+              </a:ext>
+            </a:extLst>
+          </p:cNvPr>
+          <p:cNvCxnSpPr>
+            <a:cxnSpLocks noGrp="1" noRot="1" noChangeAspect="1" noMove="1" noResize="1" noEditPoints="1" noAdjustHandles="1" noChangeArrowheads="1" noChangeShapeType="1"/>
+          </p:cNvCxnSpPr>
+          <p:nvPr>
+            <p:extLst>
+              <p:ext uri="{386F3935-93C4-4BCD-93E2-E3B085C9AB24}">
+                <p16:designElem xmlns:p16="http://schemas.microsoft.com/office/powerpoint/2015/main" val="1"/>
+              </p:ext>
+            </p:extLst>
+          </p:nvPr>
+        </p:nvCxnSpPr>
+        <p:spPr>
+          <a:xfrm>
+            <a:off x="0" y="6128413"/>
+            <a:ext cx="12192000" cy="0"/>
+          </a:xfrm>
+          <a:prstGeom prst="line">
+            <a:avLst/>
+          </a:prstGeom>
+          <a:ln w="12700">
+            <a:solidFill>
+              <a:srgbClr val="000001">
+                <a:alpha val="20000"/>
+              </a:srgbClr>
+            </a:solidFill>
+          </a:ln>
+        </p:spPr>
+        <p:style>
+          <a:lnRef idx="1">
+            <a:schemeClr val="accent1"/>
+          </a:lnRef>
+          <a:fillRef idx="0">
+            <a:schemeClr val="accent1"/>
+          </a:fillRef>
+          <a:effectRef idx="0">
+            <a:schemeClr val="accent1"/>
+          </a:effectRef>
+          <a:fontRef idx="minor">
+            <a:schemeClr val="tx1"/>
+          </a:fontRef>
+        </p:style>
+      </p:cxnSp>
+      <p:cxnSp>
+        <p:nvCxnSpPr>
+          <p:cNvPr id="26" name="Straight Connector 25">
+            <a:extLst>
+              <a:ext uri="{FF2B5EF4-FFF2-40B4-BE49-F238E27FC236}">
+                <a16:creationId xmlns:a16="http://schemas.microsoft.com/office/drawing/2014/main" id="{FA6123F2-4B61-414F-A7E5-5B7828EACAE2}"/>
+              </a:ext>
+            </a:extLst>
+          </p:cNvPr>
+          <p:cNvCxnSpPr>
+            <a:cxnSpLocks noGrp="1" noRot="1" noChangeAspect="1" noMove="1" noResize="1" noEditPoints="1" noAdjustHandles="1" noChangeArrowheads="1" noChangeShapeType="1"/>
+          </p:cNvCxnSpPr>
+          <p:nvPr>
+            <p:extLst>
+              <p:ext uri="{386F3935-93C4-4BCD-93E2-E3B085C9AB24}">
+                <p16:designElem xmlns:p16="http://schemas.microsoft.com/office/powerpoint/2015/main" val="1"/>
+              </p:ext>
+            </p:extLst>
+          </p:nvPr>
+        </p:nvCxnSpPr>
+        <p:spPr>
+          <a:xfrm>
+            <a:off x="1452617" y="3528543"/>
+            <a:ext cx="4171479" cy="0"/>
+          </a:xfrm>
+          <a:prstGeom prst="line">
+            <a:avLst/>
+          </a:prstGeom>
+          <a:ln w="31750"/>
+        </p:spPr>
+        <p:style>
+          <a:lnRef idx="3">
+            <a:schemeClr val="accent1"/>
+          </a:lnRef>
+          <a:fillRef idx="0">
+            <a:schemeClr val="accent1"/>
+          </a:fillRef>
+          <a:effectRef idx="2">
+            <a:schemeClr val="accent1"/>
+          </a:effectRef>
+          <a:fontRef idx="minor">
+            <a:schemeClr val="tx1"/>
+          </a:fontRef>
+        </p:style>
+      </p:cxnSp>
+      <p:pic>
+        <p:nvPicPr>
+          <p:cNvPr id="5" name="Content Placeholder 4">
+            <a:extLst>
+              <a:ext uri="{FF2B5EF4-FFF2-40B4-BE49-F238E27FC236}">
+                <a16:creationId xmlns:a16="http://schemas.microsoft.com/office/drawing/2014/main" id="{C487F80B-E43B-E541-B332-E0CA5BB1FD42}"/>
+              </a:ext>
+            </a:extLst>
+          </p:cNvPr>
+          <p:cNvPicPr>
+            <a:picLocks noGrp="1" noChangeAspect="1"/>
+          </p:cNvPicPr>
+          <p:nvPr>
+            <p:ph idx="1"/>
+          </p:nvPr>
+        </p:nvPicPr>
+        <p:blipFill>
+          <a:blip r:embed="rId3"/>
+          <a:stretch>
+            <a:fillRect/>
+          </a:stretch>
+        </p:blipFill>
+        <p:spPr>
+          <a:xfrm>
+            <a:off x="5955957" y="469557"/>
+            <a:ext cx="6064058" cy="5338118"/>
+          </a:xfrm>
+          <a:prstGeom prst="rect">
+            <a:avLst/>
+          </a:prstGeom>
+        </p:spPr>
+      </p:pic>
+      <p:sp>
+        <p:nvSpPr>
+          <p:cNvPr id="2" name="Title 1">
+            <a:extLst>
+              <a:ext uri="{FF2B5EF4-FFF2-40B4-BE49-F238E27FC236}">
+                <a16:creationId xmlns:a16="http://schemas.microsoft.com/office/drawing/2014/main" id="{78754D18-E9CB-9046-A51D-CFB828777E29}"/>
+              </a:ext>
+            </a:extLst>
+          </p:cNvPr>
+          <p:cNvSpPr>
+            <a:spLocks noGrp="1"/>
+          </p:cNvSpPr>
+          <p:nvPr>
+            <p:ph type="title"/>
+          </p:nvPr>
+        </p:nvSpPr>
+        <p:spPr>
+          <a:xfrm>
+            <a:off x="1452616" y="962902"/>
+            <a:ext cx="4176384" cy="2380828"/>
+          </a:xfrm>
+        </p:spPr>
+        <p:txBody>
+          <a:bodyPr vert="horz" lIns="91440" tIns="45720" rIns="91440" bIns="0" rtlCol="0" anchor="b">
+            <a:normAutofit/>
+          </a:bodyPr>
+          <a:lstStyle/>
+          <a:p>
+            <a:r>
+              <a:rPr lang="en-US" sz="4800"/>
+              <a:t>DFD LEVEL 1 </a:t>
+            </a:r>
+          </a:p>
+        </p:txBody>
+      </p:sp>
+    </p:spTree>
+    <p:extLst>
+      <p:ext uri="{BB962C8B-B14F-4D97-AF65-F5344CB8AC3E}">
+        <p14:creationId xmlns:p14="http://schemas.microsoft.com/office/powerpoint/2010/main" val="3551563365"/>
+      </p:ext>
+    </p:extLst>
+  </p:cSld>
+  <p:clrMapOvr>
+    <a:masterClrMapping/>
+  </p:clrMapOvr>
+</p:sld>
+</file>
+
+<file path=ppt/slides/slide7.xml><?xml version="1.0" encoding="utf-8"?>
+<p:sld xmlns:a="http://schemas.openxmlformats.org/drawingml/2006/main" xmlns:r="http://schemas.openxmlformats.org/officeDocument/2006/relationships" xmlns:p="http://schemas.openxmlformats.org/presentationml/2006/main">
+  <p:cSld>
+    <p:bg>
+      <p:bgPr>
+        <a:gradFill rotWithShape="1">
+          <a:gsLst>
+            <a:gs pos="0">
+              <a:schemeClr val="bg2">
+                <a:tint val="94000"/>
+                <a:satMod val="80000"/>
+                <a:lumMod val="106000"/>
+              </a:schemeClr>
+            </a:gs>
+            <a:gs pos="100000">
+              <a:schemeClr val="bg2">
+                <a:shade val="80000"/>
+              </a:schemeClr>
+            </a:gs>
+          </a:gsLst>
+          <a:path path="circle">
+            <a:fillToRect l="43000" r="43000" b="100000"/>
+          </a:path>
+        </a:gradFill>
+        <a:effectLst/>
+      </p:bgPr>
+    </p:bg>
+    <p:spTree>
+      <p:nvGrpSpPr>
+        <p:cNvPr id="1" name=""/>
+        <p:cNvGrpSpPr/>
+        <p:nvPr/>
+      </p:nvGrpSpPr>
+      <p:grpSpPr>
+        <a:xfrm>
+          <a:off x="0" y="0"/>
+          <a:ext cx="0" cy="0"/>
+          <a:chOff x="0" y="0"/>
+          <a:chExt cx="0" cy="0"/>
+        </a:xfrm>
+      </p:grpSpPr>
+      <p:sp>
+        <p:nvSpPr>
+          <p:cNvPr id="12" name="Rectangle 11">
+            <a:extLst>
+              <a:ext uri="{FF2B5EF4-FFF2-40B4-BE49-F238E27FC236}">
+                <a16:creationId xmlns:a16="http://schemas.microsoft.com/office/drawing/2014/main" id="{EEA869E1-F851-4A52-92F5-77E592B76A5B}"/>
+              </a:ext>
+            </a:extLst>
+          </p:cNvPr>
+          <p:cNvSpPr>
+            <a:spLocks noGrp="1" noRot="1" noChangeAspect="1" noMove="1" noResize="1" noEditPoints="1" noAdjustHandles="1" noChangeArrowheads="1" noChangeShapeType="1" noTextEdit="1"/>
+          </p:cNvSpPr>
+          <p:nvPr>
+            <p:extLst>
+              <p:ext uri="{386F3935-93C4-4BCD-93E2-E3B085C9AB24}">
+                <p16:designElem xmlns:p16="http://schemas.microsoft.com/office/powerpoint/2015/main" val="1"/>
+              </p:ext>
+            </p:extLst>
+          </p:nvPr>
+        </p:nvSpPr>
+        <p:spPr>
+          <a:xfrm>
+            <a:off x="0" y="2019476"/>
+            <a:ext cx="12192000" cy="4105941"/>
+          </a:xfrm>
+          <a:prstGeom prst="rect">
+            <a:avLst/>
+          </a:prstGeom>
+          <a:gradFill flip="none" rotWithShape="1">
+            <a:gsLst>
+              <a:gs pos="0">
+                <a:schemeClr val="bg2">
+                  <a:alpha val="0"/>
+                </a:schemeClr>
+              </a:gs>
+              <a:gs pos="100000">
+                <a:schemeClr val="bg2"/>
+              </a:gs>
+            </a:gsLst>
+            <a:lin ang="5400000" scaled="0"/>
+            <a:tileRect/>
+          </a:gradFill>
+          <a:ln>
+            <a:noFill/>
+          </a:ln>
+        </p:spPr>
+        <p:style>
+          <a:lnRef idx="2">
+            <a:schemeClr val="accent1">
+              <a:shade val="50000"/>
+            </a:schemeClr>
+          </a:lnRef>
+          <a:fillRef idx="1">
+            <a:schemeClr val="accent1"/>
+          </a:fillRef>
+          <a:effectRef idx="0">
+            <a:schemeClr val="accent1"/>
+          </a:effectRef>
+          <a:fontRef idx="minor">
+            <a:schemeClr val="lt1"/>
+          </a:fontRef>
+        </p:style>
+      </p:sp>
+      <p:pic>
+        <p:nvPicPr>
+          <p:cNvPr id="14" name="Picture 13">
+            <a:extLst>
+              <a:ext uri="{FF2B5EF4-FFF2-40B4-BE49-F238E27FC236}">
+                <a16:creationId xmlns:a16="http://schemas.microsoft.com/office/drawing/2014/main" id="{B083AD55-8296-44BD-8E14-DD2DDBC351B0}"/>
+              </a:ext>
+            </a:extLst>
+          </p:cNvPr>
+          <p:cNvPicPr>
+            <a:picLocks noGrp="1" noRot="1" noChangeAspect="1" noMove="1" noResize="1" noEditPoints="1" noAdjustHandles="1" noChangeArrowheads="1" noChangeShapeType="1" noCrop="1"/>
+          </p:cNvPicPr>
+          <p:nvPr>
+            <p:extLst>
+              <p:ext uri="{386F3935-93C4-4BCD-93E2-E3B085C9AB24}">
+                <p16:designElem xmlns:p16="http://schemas.microsoft.com/office/powerpoint/2015/main" val="1"/>
+              </p:ext>
+            </p:extLst>
+          </p:nvPr>
+        </p:nvPicPr>
+        <p:blipFill rotWithShape="1">
+          <a:blip r:embed="rId2">
+            <a:extLst>
+              <a:ext uri="{28A0092B-C50C-407E-A947-70E740481C1C}">
+                <a14:useLocalDpi xmlns:a14="http://schemas.microsoft.com/office/drawing/2010/main" val="0"/>
+              </a:ext>
+            </a:extLst>
+          </a:blip>
+          <a:srcRect t="1538" b="-1538"/>
+          <a:stretch/>
+        </p:blipFill>
+        <p:spPr bwMode="black">
+          <a:xfrm>
+            <a:off x="0" y="6126480"/>
+            <a:ext cx="12192000" cy="742950"/>
+          </a:xfrm>
+          <a:prstGeom prst="rect">
+            <a:avLst/>
+          </a:prstGeom>
+        </p:spPr>
+      </p:pic>
+      <p:cxnSp>
+        <p:nvCxnSpPr>
+          <p:cNvPr id="16" name="Straight Connector 15">
+            <a:extLst>
+              <a:ext uri="{FF2B5EF4-FFF2-40B4-BE49-F238E27FC236}">
+                <a16:creationId xmlns:a16="http://schemas.microsoft.com/office/drawing/2014/main" id="{2BF46B26-15FC-4C5A-94FA-AE9ED64B5C20}"/>
+              </a:ext>
+            </a:extLst>
+          </p:cNvPr>
+          <p:cNvCxnSpPr>
+            <a:cxnSpLocks noGrp="1" noRot="1" noChangeAspect="1" noMove="1" noResize="1" noEditPoints="1" noAdjustHandles="1" noChangeArrowheads="1" noChangeShapeType="1"/>
+          </p:cNvCxnSpPr>
+          <p:nvPr>
+            <p:extLst>
+              <p:ext uri="{386F3935-93C4-4BCD-93E2-E3B085C9AB24}">
+                <p16:designElem xmlns:p16="http://schemas.microsoft.com/office/powerpoint/2015/main" val="1"/>
+              </p:ext>
+            </p:extLst>
+          </p:nvPr>
+        </p:nvCxnSpPr>
+        <p:spPr>
+          <a:xfrm>
+            <a:off x="0" y="6128413"/>
+            <a:ext cx="12192000" cy="0"/>
+          </a:xfrm>
+          <a:prstGeom prst="line">
+            <a:avLst/>
+          </a:prstGeom>
+          <a:ln w="12700">
+            <a:solidFill>
+              <a:srgbClr val="000001">
+                <a:alpha val="20000"/>
+              </a:srgbClr>
+            </a:solidFill>
+          </a:ln>
+        </p:spPr>
+        <p:style>
+          <a:lnRef idx="1">
+            <a:schemeClr val="accent1"/>
+          </a:lnRef>
+          <a:fillRef idx="0">
+            <a:schemeClr val="accent1"/>
+          </a:fillRef>
+          <a:effectRef idx="0">
+            <a:schemeClr val="accent1"/>
+          </a:effectRef>
+          <a:fontRef idx="minor">
+            <a:schemeClr val="tx1"/>
+          </a:fontRef>
+        </p:style>
+      </p:cxnSp>
+      <p:cxnSp>
+        <p:nvCxnSpPr>
+          <p:cNvPr id="18" name="Straight Connector 17">
+            <a:extLst>
+              <a:ext uri="{FF2B5EF4-FFF2-40B4-BE49-F238E27FC236}">
+                <a16:creationId xmlns:a16="http://schemas.microsoft.com/office/drawing/2014/main" id="{912F6065-5345-44BD-B66E-5487CCD7A9B9}"/>
+              </a:ext>
+            </a:extLst>
+          </p:cNvPr>
+          <p:cNvCxnSpPr>
+            <a:cxnSpLocks noGrp="1" noRot="1" noChangeAspect="1" noMove="1" noResize="1" noEditPoints="1" noAdjustHandles="1" noChangeArrowheads="1" noChangeShapeType="1"/>
+          </p:cNvCxnSpPr>
+          <p:nvPr>
+            <p:extLst>
+              <p:ext uri="{386F3935-93C4-4BCD-93E2-E3B085C9AB24}">
+                <p16:designElem xmlns:p16="http://schemas.microsoft.com/office/powerpoint/2015/main" val="1"/>
+              </p:ext>
+            </p:extLst>
+          </p:nvPr>
+        </p:nvCxnSpPr>
+        <p:spPr>
+          <a:xfrm>
+            <a:off x="2417780" y="3528542"/>
+            <a:ext cx="8637072" cy="0"/>
+          </a:xfrm>
+          <a:prstGeom prst="line">
+            <a:avLst/>
+          </a:prstGeom>
+          <a:ln w="31750"/>
+        </p:spPr>
+        <p:style>
+          <a:lnRef idx="3">
+            <a:schemeClr val="accent1"/>
+          </a:lnRef>
+          <a:fillRef idx="0">
+            <a:schemeClr val="accent1"/>
+          </a:fillRef>
+          <a:effectRef idx="2">
+            <a:schemeClr val="accent1"/>
+          </a:effectRef>
+          <a:fontRef idx="minor">
+            <a:schemeClr val="tx1"/>
+          </a:fontRef>
+        </p:style>
+      </p:cxnSp>
+      <p:sp useBgFill="1">
+        <p:nvSpPr>
+          <p:cNvPr id="20" name="Rectangle 19">
+            <a:extLst>
+              <a:ext uri="{FF2B5EF4-FFF2-40B4-BE49-F238E27FC236}">
+                <a16:creationId xmlns:a16="http://schemas.microsoft.com/office/drawing/2014/main" id="{E7ABCFA2-55B0-438C-A39A-637FFC6246E8}"/>
+              </a:ext>
+            </a:extLst>
+          </p:cNvPr>
+          <p:cNvSpPr>
+            <a:spLocks noGrp="1" noRot="1" noChangeAspect="1" noMove="1" noResize="1" noEditPoints="1" noAdjustHandles="1" noChangeArrowheads="1" noChangeShapeType="1" noTextEdit="1"/>
+          </p:cNvSpPr>
+          <p:nvPr>
+            <p:extLst>
+              <p:ext uri="{386F3935-93C4-4BCD-93E2-E3B085C9AB24}">
+                <p16:designElem xmlns:p16="http://schemas.microsoft.com/office/powerpoint/2015/main" val="1"/>
+              </p:ext>
+            </p:extLst>
+          </p:nvPr>
+        </p:nvSpPr>
+        <p:spPr>
+          <a:xfrm>
+            <a:off x="2" y="0"/>
+            <a:ext cx="12191695" cy="6858000"/>
+          </a:xfrm>
+          <a:prstGeom prst="rect">
+            <a:avLst/>
+          </a:prstGeom>
+          <a:ln>
+            <a:noFill/>
+          </a:ln>
+        </p:spPr>
+        <p:style>
+          <a:lnRef idx="2">
+            <a:schemeClr val="accent1">
+              <a:shade val="50000"/>
+            </a:schemeClr>
+          </a:lnRef>
+          <a:fillRef idx="1">
+            <a:schemeClr val="accent1"/>
+          </a:fillRef>
+          <a:effectRef idx="0">
+            <a:schemeClr val="accent1"/>
+          </a:effectRef>
+          <a:fontRef idx="minor">
+            <a:schemeClr val="lt1"/>
+          </a:fontRef>
+        </p:style>
+        <p:txBody>
+          <a:bodyPr rtlCol="0" anchor="ctr"/>
+          <a:lstStyle/>
+          <a:p>
+            <a:pPr algn="ctr"/>
+            <a:endParaRPr lang="en-US"/>
+          </a:p>
+        </p:txBody>
+      </p:sp>
+      <p:sp>
+        <p:nvSpPr>
+          <p:cNvPr id="22" name="Rectangle 21">
+            <a:extLst>
+              <a:ext uri="{FF2B5EF4-FFF2-40B4-BE49-F238E27FC236}">
+                <a16:creationId xmlns:a16="http://schemas.microsoft.com/office/drawing/2014/main" id="{1BD2C934-710E-4E0E-9ED4-03F07E019205}"/>
+              </a:ext>
+            </a:extLst>
+          </p:cNvPr>
+          <p:cNvSpPr>
+            <a:spLocks noGrp="1" noRot="1" noChangeAspect="1" noMove="1" noResize="1" noEditPoints="1" noAdjustHandles="1" noChangeArrowheads="1" noChangeShapeType="1" noTextEdit="1"/>
+          </p:cNvSpPr>
+          <p:nvPr>
+            <p:extLst>
+              <p:ext uri="{386F3935-93C4-4BCD-93E2-E3B085C9AB24}">
+                <p16:designElem xmlns:p16="http://schemas.microsoft.com/office/powerpoint/2015/main" val="1"/>
+              </p:ext>
+            </p:extLst>
+          </p:nvPr>
+        </p:nvSpPr>
+        <p:spPr>
+          <a:xfrm>
+            <a:off x="0" y="2019476"/>
+            <a:ext cx="12192000" cy="4105941"/>
+          </a:xfrm>
+          <a:prstGeom prst="rect">
+            <a:avLst/>
+          </a:prstGeom>
+          <a:gradFill flip="none" rotWithShape="1">
+            <a:gsLst>
+              <a:gs pos="0">
+                <a:schemeClr val="bg2">
+                  <a:alpha val="0"/>
+                </a:schemeClr>
+              </a:gs>
+              <a:gs pos="100000">
+                <a:schemeClr val="bg2"/>
+              </a:gs>
+            </a:gsLst>
+            <a:lin ang="5400000" scaled="0"/>
+            <a:tileRect/>
+          </a:gradFill>
+          <a:ln>
+            <a:noFill/>
+          </a:ln>
+        </p:spPr>
+        <p:style>
+          <a:lnRef idx="2">
+            <a:schemeClr val="accent1">
+              <a:shade val="50000"/>
+            </a:schemeClr>
+          </a:lnRef>
+          <a:fillRef idx="1">
+            <a:schemeClr val="accent1"/>
+          </a:fillRef>
+          <a:effectRef idx="0">
+            <a:schemeClr val="accent1"/>
+          </a:effectRef>
+          <a:fontRef idx="minor">
+            <a:schemeClr val="lt1"/>
+          </a:fontRef>
+        </p:style>
+        <p:txBody>
+          <a:bodyPr rtlCol="0" anchor="ctr"/>
+          <a:lstStyle/>
+          <a:p>
+            <a:pPr lvl="0" algn="ctr"/>
+            <a:endParaRPr lang="en-US"/>
+          </a:p>
+        </p:txBody>
+      </p:sp>
+      <p:pic>
+        <p:nvPicPr>
+          <p:cNvPr id="24" name="Picture 23">
+            <a:extLst>
+              <a:ext uri="{FF2B5EF4-FFF2-40B4-BE49-F238E27FC236}">
+                <a16:creationId xmlns:a16="http://schemas.microsoft.com/office/drawing/2014/main" id="{B0A40572-62E5-460B-AD24-B6628527ACB1}"/>
+              </a:ext>
+            </a:extLst>
+          </p:cNvPr>
+          <p:cNvPicPr>
+            <a:picLocks noGrp="1" noRot="1" noChangeAspect="1" noMove="1" noResize="1" noEditPoints="1" noAdjustHandles="1" noChangeArrowheads="1" noChangeShapeType="1" noCrop="1"/>
+          </p:cNvPicPr>
+          <p:nvPr>
+            <p:extLst>
+              <p:ext uri="{386F3935-93C4-4BCD-93E2-E3B085C9AB24}">
+                <p16:designElem xmlns:p16="http://schemas.microsoft.com/office/powerpoint/2015/main" val="1"/>
+              </p:ext>
+            </p:extLst>
+          </p:nvPr>
+        </p:nvPicPr>
+        <p:blipFill rotWithShape="1">
+          <a:blip r:embed="rId2">
+            <a:extLst>
+              <a:ext uri="{28A0092B-C50C-407E-A947-70E740481C1C}">
+                <a14:useLocalDpi xmlns:a14="http://schemas.microsoft.com/office/drawing/2010/main" val="0"/>
+              </a:ext>
+            </a:extLst>
+          </a:blip>
+          <a:srcRect t="1538" b="-1538"/>
+          <a:stretch/>
+        </p:blipFill>
+        <p:spPr bwMode="black">
+          <a:xfrm>
+            <a:off x="0" y="6126480"/>
+            <a:ext cx="12192000" cy="742950"/>
+          </a:xfrm>
+          <a:prstGeom prst="rect">
+            <a:avLst/>
+          </a:prstGeom>
+        </p:spPr>
+      </p:pic>
+      <p:cxnSp>
+        <p:nvCxnSpPr>
+          <p:cNvPr id="26" name="Straight Connector 25">
+            <a:extLst>
+              <a:ext uri="{FF2B5EF4-FFF2-40B4-BE49-F238E27FC236}">
+                <a16:creationId xmlns:a16="http://schemas.microsoft.com/office/drawing/2014/main" id="{F1D872D4-D7E5-4CD8-9DAC-2BC612F08E69}"/>
+              </a:ext>
+            </a:extLst>
+          </p:cNvPr>
+          <p:cNvCxnSpPr>
+            <a:cxnSpLocks noGrp="1" noRot="1" noChangeAspect="1" noMove="1" noResize="1" noEditPoints="1" noAdjustHandles="1" noChangeArrowheads="1" noChangeShapeType="1"/>
+          </p:cNvCxnSpPr>
+          <p:nvPr>
+            <p:extLst>
+              <p:ext uri="{386F3935-93C4-4BCD-93E2-E3B085C9AB24}">
+                <p16:designElem xmlns:p16="http://schemas.microsoft.com/office/powerpoint/2015/main" val="1"/>
+              </p:ext>
+            </p:extLst>
+          </p:nvPr>
+        </p:nvCxnSpPr>
+        <p:spPr>
+          <a:xfrm>
+            <a:off x="0" y="6128413"/>
+            <a:ext cx="12192000" cy="0"/>
+          </a:xfrm>
+          <a:prstGeom prst="line">
+            <a:avLst/>
+          </a:prstGeom>
+          <a:ln w="12700">
+            <a:solidFill>
+              <a:srgbClr val="000001">
+                <a:alpha val="20000"/>
+              </a:srgbClr>
+            </a:solidFill>
+          </a:ln>
+        </p:spPr>
+        <p:style>
+          <a:lnRef idx="1">
+            <a:schemeClr val="accent1"/>
+          </a:lnRef>
+          <a:fillRef idx="0">
+            <a:schemeClr val="accent1"/>
+          </a:fillRef>
+          <a:effectRef idx="0">
+            <a:schemeClr val="accent1"/>
+          </a:effectRef>
+          <a:fontRef idx="minor">
+            <a:schemeClr val="tx1"/>
+          </a:fontRef>
+        </p:style>
+      </p:cxnSp>
+      <p:cxnSp>
+        <p:nvCxnSpPr>
+          <p:cNvPr id="28" name="Straight Connector 27">
+            <a:extLst>
+              <a:ext uri="{FF2B5EF4-FFF2-40B4-BE49-F238E27FC236}">
+                <a16:creationId xmlns:a16="http://schemas.microsoft.com/office/drawing/2014/main" id="{0AD0F4F3-8F5C-421F-9FC1-DB3ED0BF61DF}"/>
+              </a:ext>
+            </a:extLst>
+          </p:cNvPr>
+          <p:cNvCxnSpPr>
+            <a:cxnSpLocks noGrp="1" noRot="1" noChangeAspect="1" noMove="1" noResize="1" noEditPoints="1" noAdjustHandles="1" noChangeArrowheads="1" noChangeShapeType="1"/>
+          </p:cNvCxnSpPr>
+          <p:nvPr>
+            <p:extLst>
+              <p:ext uri="{386F3935-93C4-4BCD-93E2-E3B085C9AB24}">
+                <p16:designElem xmlns:p16="http://schemas.microsoft.com/office/powerpoint/2015/main" val="1"/>
+              </p:ext>
+            </p:extLst>
+          </p:nvPr>
+        </p:nvCxnSpPr>
+        <p:spPr>
+          <a:xfrm>
+            <a:off x="484009" y="3526496"/>
+            <a:ext cx="3023617" cy="0"/>
+          </a:xfrm>
+          <a:prstGeom prst="line">
+            <a:avLst/>
+          </a:prstGeom>
+          <a:ln w="31750"/>
+        </p:spPr>
+        <p:style>
+          <a:lnRef idx="3">
+            <a:schemeClr val="accent1"/>
+          </a:lnRef>
+          <a:fillRef idx="0">
+            <a:schemeClr val="accent1"/>
+          </a:fillRef>
+          <a:effectRef idx="2">
+            <a:schemeClr val="accent1"/>
+          </a:effectRef>
+          <a:fontRef idx="minor">
+            <a:schemeClr val="tx1"/>
+          </a:fontRef>
+        </p:style>
+      </p:cxnSp>
+      <p:pic>
+        <p:nvPicPr>
+          <p:cNvPr id="5" name="Content Placeholder 4">
+            <a:extLst>
+              <a:ext uri="{FF2B5EF4-FFF2-40B4-BE49-F238E27FC236}">
+                <a16:creationId xmlns:a16="http://schemas.microsoft.com/office/drawing/2014/main" id="{EB468542-FE65-684A-B0C1-CD223F6AF414}"/>
+              </a:ext>
+            </a:extLst>
+          </p:cNvPr>
+          <p:cNvPicPr>
+            <a:picLocks noGrp="1" noChangeAspect="1"/>
+          </p:cNvPicPr>
+          <p:nvPr>
+            <p:ph idx="1"/>
+          </p:nvPr>
+        </p:nvPicPr>
+        <p:blipFill>
+          <a:blip r:embed="rId3"/>
+          <a:stretch>
+            <a:fillRect/>
+          </a:stretch>
+        </p:blipFill>
+        <p:spPr>
+          <a:xfrm>
+            <a:off x="3991633" y="338463"/>
+            <a:ext cx="3692411" cy="3360093"/>
+          </a:xfrm>
+          <a:prstGeom prst="rect">
+            <a:avLst/>
+          </a:prstGeom>
+        </p:spPr>
+      </p:pic>
+      <p:pic>
+        <p:nvPicPr>
+          <p:cNvPr id="7" name="Picture 6">
+            <a:extLst>
+              <a:ext uri="{FF2B5EF4-FFF2-40B4-BE49-F238E27FC236}">
+                <a16:creationId xmlns:a16="http://schemas.microsoft.com/office/drawing/2014/main" id="{3227218F-F6DA-F14C-9D75-7CD9A17C60A1}"/>
+              </a:ext>
+            </a:extLst>
+          </p:cNvPr>
+          <p:cNvPicPr>
+            <a:picLocks noChangeAspect="1"/>
+          </p:cNvPicPr>
+          <p:nvPr/>
+        </p:nvPicPr>
+        <p:blipFill>
+          <a:blip r:embed="rId4"/>
+          <a:stretch>
+            <a:fillRect/>
+          </a:stretch>
+        </p:blipFill>
+        <p:spPr>
+          <a:xfrm>
+            <a:off x="7841821" y="332615"/>
+            <a:ext cx="3692411" cy="3350861"/>
+          </a:xfrm>
+          <a:prstGeom prst="rect">
+            <a:avLst/>
+          </a:prstGeom>
+        </p:spPr>
+      </p:pic>
+      <p:sp>
+        <p:nvSpPr>
+          <p:cNvPr id="2" name="Title 1">
+            <a:extLst>
+              <a:ext uri="{FF2B5EF4-FFF2-40B4-BE49-F238E27FC236}">
+                <a16:creationId xmlns:a16="http://schemas.microsoft.com/office/drawing/2014/main" id="{301A3B51-3B6F-724B-BD78-801B47B85B96}"/>
+              </a:ext>
+            </a:extLst>
+          </p:cNvPr>
+          <p:cNvSpPr>
+            <a:spLocks noGrp="1"/>
+          </p:cNvSpPr>
+          <p:nvPr>
+            <p:ph type="title"/>
+          </p:nvPr>
+        </p:nvSpPr>
+        <p:spPr>
+          <a:xfrm>
+            <a:off x="485695" y="1474969"/>
+            <a:ext cx="3026558" cy="1868760"/>
+          </a:xfrm>
+        </p:spPr>
+        <p:txBody>
+          <a:bodyPr vert="horz" lIns="91440" tIns="45720" rIns="91440" bIns="0" rtlCol="0" anchor="b">
+            <a:normAutofit/>
+          </a:bodyPr>
+          <a:lstStyle/>
+          <a:p>
+            <a:r>
+              <a:rPr lang="en-US" sz="3600" dirty="0"/>
+              <a:t>Picture Reader Module</a:t>
+            </a:r>
+          </a:p>
+        </p:txBody>
+      </p:sp>
+      <p:pic>
+        <p:nvPicPr>
+          <p:cNvPr id="9" name="Picture 8">
+            <a:extLst>
+              <a:ext uri="{FF2B5EF4-FFF2-40B4-BE49-F238E27FC236}">
+                <a16:creationId xmlns:a16="http://schemas.microsoft.com/office/drawing/2014/main" id="{CC75610E-F6F1-B344-97B6-4C2CBE4428F6}"/>
+              </a:ext>
+            </a:extLst>
+          </p:cNvPr>
+          <p:cNvPicPr>
+            <a:picLocks noChangeAspect="1"/>
+          </p:cNvPicPr>
+          <p:nvPr/>
+        </p:nvPicPr>
+        <p:blipFill>
+          <a:blip r:embed="rId5"/>
+          <a:stretch>
+            <a:fillRect/>
+          </a:stretch>
+        </p:blipFill>
+        <p:spPr>
+          <a:xfrm>
+            <a:off x="2417780" y="4093309"/>
+            <a:ext cx="9379147" cy="1880416"/>
+          </a:xfrm>
+          <a:prstGeom prst="rect">
+            <a:avLst/>
+          </a:prstGeom>
+        </p:spPr>
+      </p:pic>
+    </p:spTree>
+    <p:extLst>
+      <p:ext uri="{BB962C8B-B14F-4D97-AF65-F5344CB8AC3E}">
+        <p14:creationId xmlns:p14="http://schemas.microsoft.com/office/powerpoint/2010/main" val="2416765163"/>
+      </p:ext>
+    </p:extLst>
+  </p:cSld>
+  <p:clrMapOvr>
+    <a:masterClrMapping/>
+  </p:clrMapOvr>
+</p:sld>
+</file>
+
+<file path=ppt/slides/slide8.xml><?xml version="1.0" encoding="utf-8"?>
+<p:sld xmlns:a="http://schemas.openxmlformats.org/drawingml/2006/main" xmlns:r="http://schemas.openxmlformats.org/officeDocument/2006/relationships" xmlns:p="http://schemas.openxmlformats.org/presentationml/2006/main">
+  <p:cSld>
+    <p:bg>
+      <p:bgPr>
+        <a:gradFill rotWithShape="1">
+          <a:gsLst>
+            <a:gs pos="0">
+              <a:schemeClr val="bg2">
+                <a:tint val="94000"/>
+                <a:satMod val="80000"/>
+                <a:lumMod val="106000"/>
+              </a:schemeClr>
+            </a:gs>
+            <a:gs pos="100000">
+              <a:schemeClr val="bg2">
+                <a:shade val="80000"/>
+              </a:schemeClr>
+            </a:gs>
+          </a:gsLst>
+          <a:path path="circle">
+            <a:fillToRect l="43000" r="43000" b="100000"/>
+          </a:path>
+        </a:gradFill>
+        <a:effectLst/>
+      </p:bgPr>
+    </p:bg>
+    <p:spTree>
+      <p:nvGrpSpPr>
+        <p:cNvPr id="1" name=""/>
+        <p:cNvGrpSpPr/>
+        <p:nvPr/>
+      </p:nvGrpSpPr>
+      <p:grpSpPr>
+        <a:xfrm>
+          <a:off x="0" y="0"/>
+          <a:ext cx="0" cy="0"/>
+          <a:chOff x="0" y="0"/>
+          <a:chExt cx="0" cy="0"/>
+        </a:xfrm>
+      </p:grpSpPr>
+      <p:sp>
+        <p:nvSpPr>
+          <p:cNvPr id="10" name="Rectangle 9">
+            <a:extLst>
+              <a:ext uri="{FF2B5EF4-FFF2-40B4-BE49-F238E27FC236}">
+                <a16:creationId xmlns:a16="http://schemas.microsoft.com/office/drawing/2014/main" id="{0CABCAE3-64FC-4149-819F-2C1812824154}"/>
+              </a:ext>
+            </a:extLst>
+          </p:cNvPr>
+          <p:cNvSpPr>
+            <a:spLocks noGrp="1" noRot="1" noChangeAspect="1" noMove="1" noResize="1" noEditPoints="1" noAdjustHandles="1" noChangeArrowheads="1" noChangeShapeType="1" noTextEdit="1"/>
+          </p:cNvSpPr>
+          <p:nvPr>
+            <p:extLst>
+              <p:ext uri="{386F3935-93C4-4BCD-93E2-E3B085C9AB24}">
+                <p16:designElem xmlns:p16="http://schemas.microsoft.com/office/powerpoint/2015/main" val="1"/>
+              </p:ext>
+            </p:extLst>
+          </p:nvPr>
+        </p:nvSpPr>
+        <p:spPr>
+          <a:xfrm>
+            <a:off x="0" y="2019476"/>
+            <a:ext cx="12192000" cy="4105941"/>
+          </a:xfrm>
+          <a:prstGeom prst="rect">
+            <a:avLst/>
+          </a:prstGeom>
+          <a:gradFill flip="none" rotWithShape="1">
+            <a:gsLst>
+              <a:gs pos="0">
+                <a:schemeClr val="bg2">
+                  <a:alpha val="0"/>
+                </a:schemeClr>
+              </a:gs>
+              <a:gs pos="100000">
+                <a:schemeClr val="bg2"/>
+              </a:gs>
+            </a:gsLst>
+            <a:lin ang="5400000" scaled="0"/>
+            <a:tileRect/>
+          </a:gradFill>
+          <a:ln>
+            <a:noFill/>
+          </a:ln>
+        </p:spPr>
+        <p:style>
+          <a:lnRef idx="2">
+            <a:schemeClr val="accent1">
+              <a:shade val="50000"/>
+            </a:schemeClr>
+          </a:lnRef>
+          <a:fillRef idx="1">
+            <a:schemeClr val="accent1"/>
+          </a:fillRef>
+          <a:effectRef idx="0">
+            <a:schemeClr val="accent1"/>
+          </a:effectRef>
+          <a:fontRef idx="minor">
+            <a:schemeClr val="lt1"/>
+          </a:fontRef>
+        </p:style>
+      </p:sp>
+      <p:pic>
+        <p:nvPicPr>
+          <p:cNvPr id="12" name="Picture 11">
+            <a:extLst>
+              <a:ext uri="{FF2B5EF4-FFF2-40B4-BE49-F238E27FC236}">
+                <a16:creationId xmlns:a16="http://schemas.microsoft.com/office/drawing/2014/main" id="{012FDCFE-9AD2-4D8A-8CBF-B3AA37EBF6DD}"/>
+              </a:ext>
+            </a:extLst>
+          </p:cNvPr>
+          <p:cNvPicPr>
+            <a:picLocks noGrp="1" noRot="1" noChangeAspect="1" noMove="1" noResize="1" noEditPoints="1" noAdjustHandles="1" noChangeArrowheads="1" noChangeShapeType="1" noCrop="1"/>
+          </p:cNvPicPr>
+          <p:nvPr>
+            <p:extLst>
+              <p:ext uri="{386F3935-93C4-4BCD-93E2-E3B085C9AB24}">
+                <p16:designElem xmlns:p16="http://schemas.microsoft.com/office/powerpoint/2015/main" val="1"/>
+              </p:ext>
+            </p:extLst>
+          </p:nvPr>
+        </p:nvPicPr>
+        <p:blipFill rotWithShape="1">
+          <a:blip r:embed="rId2">
+            <a:extLst>
+              <a:ext uri="{28A0092B-C50C-407E-A947-70E740481C1C}">
+                <a14:useLocalDpi xmlns:a14="http://schemas.microsoft.com/office/drawing/2010/main" val="0"/>
+              </a:ext>
+            </a:extLst>
+          </a:blip>
+          <a:srcRect t="1538" b="-1538"/>
+          <a:stretch/>
+        </p:blipFill>
+        <p:spPr bwMode="black">
+          <a:xfrm>
+            <a:off x="0" y="6126480"/>
+            <a:ext cx="12192000" cy="742950"/>
+          </a:xfrm>
+          <a:prstGeom prst="rect">
+            <a:avLst/>
+          </a:prstGeom>
+        </p:spPr>
+      </p:pic>
+      <p:cxnSp>
+        <p:nvCxnSpPr>
+          <p:cNvPr id="14" name="Straight Connector 13">
+            <a:extLst>
+              <a:ext uri="{FF2B5EF4-FFF2-40B4-BE49-F238E27FC236}">
+                <a16:creationId xmlns:a16="http://schemas.microsoft.com/office/drawing/2014/main" id="{FBD463FC-4CA8-4FF4-85A3-AF9F4B98D210}"/>
+              </a:ext>
+            </a:extLst>
+          </p:cNvPr>
+          <p:cNvCxnSpPr>
+            <a:cxnSpLocks noGrp="1" noRot="1" noChangeAspect="1" noMove="1" noResize="1" noEditPoints="1" noAdjustHandles="1" noChangeArrowheads="1" noChangeShapeType="1"/>
+          </p:cNvCxnSpPr>
+          <p:nvPr>
+            <p:extLst>
+              <p:ext uri="{386F3935-93C4-4BCD-93E2-E3B085C9AB24}">
+                <p16:designElem xmlns:p16="http://schemas.microsoft.com/office/powerpoint/2015/main" val="1"/>
+              </p:ext>
+            </p:extLst>
+          </p:nvPr>
+        </p:nvCxnSpPr>
+        <p:spPr>
+          <a:xfrm>
+            <a:off x="0" y="6128413"/>
+            <a:ext cx="12192000" cy="0"/>
+          </a:xfrm>
+          <a:prstGeom prst="line">
+            <a:avLst/>
+          </a:prstGeom>
+          <a:ln w="12700">
+            <a:solidFill>
+              <a:srgbClr val="000001">
+                <a:alpha val="20000"/>
+              </a:srgbClr>
+            </a:solidFill>
+          </a:ln>
+        </p:spPr>
+        <p:style>
+          <a:lnRef idx="1">
+            <a:schemeClr val="accent1"/>
+          </a:lnRef>
+          <a:fillRef idx="0">
+            <a:schemeClr val="accent1"/>
+          </a:fillRef>
+          <a:effectRef idx="0">
+            <a:schemeClr val="accent1"/>
+          </a:effectRef>
+          <a:fontRef idx="minor">
+            <a:schemeClr val="tx1"/>
+          </a:fontRef>
+        </p:style>
+      </p:cxnSp>
+      <p:cxnSp>
+        <p:nvCxnSpPr>
+          <p:cNvPr id="16" name="Straight Connector 15">
+            <a:extLst>
+              <a:ext uri="{FF2B5EF4-FFF2-40B4-BE49-F238E27FC236}">
+                <a16:creationId xmlns:a16="http://schemas.microsoft.com/office/drawing/2014/main" id="{BECF35C3-8B44-4F4B-BD25-4C01823DB22A}"/>
+              </a:ext>
+            </a:extLst>
+          </p:cNvPr>
+          <p:cNvCxnSpPr>
+            <a:cxnSpLocks noGrp="1" noRot="1" noChangeAspect="1" noMove="1" noResize="1" noEditPoints="1" noAdjustHandles="1" noChangeArrowheads="1" noChangeShapeType="1"/>
+          </p:cNvCxnSpPr>
+          <p:nvPr>
+            <p:extLst>
+              <p:ext uri="{386F3935-93C4-4BCD-93E2-E3B085C9AB24}">
+                <p16:designElem xmlns:p16="http://schemas.microsoft.com/office/powerpoint/2015/main" val="1"/>
+              </p:ext>
+            </p:extLst>
+          </p:nvPr>
+        </p:nvCxnSpPr>
+        <p:spPr>
+          <a:xfrm>
+            <a:off x="2417780" y="3528542"/>
+            <a:ext cx="8637072" cy="0"/>
+          </a:xfrm>
+          <a:prstGeom prst="line">
+            <a:avLst/>
+          </a:prstGeom>
+          <a:ln w="31750"/>
+        </p:spPr>
+        <p:style>
+          <a:lnRef idx="3">
+            <a:schemeClr val="accent1"/>
+          </a:lnRef>
+          <a:fillRef idx="0">
+            <a:schemeClr val="accent1"/>
+          </a:fillRef>
+          <a:effectRef idx="2">
+            <a:schemeClr val="accent1"/>
+          </a:effectRef>
+          <a:fontRef idx="minor">
+            <a:schemeClr val="tx1"/>
+          </a:fontRef>
+        </p:style>
+      </p:cxnSp>
+      <p:sp useBgFill="1">
+        <p:nvSpPr>
+          <p:cNvPr id="18" name="Rectangle 17">
+            <a:extLst>
+              <a:ext uri="{FF2B5EF4-FFF2-40B4-BE49-F238E27FC236}">
+                <a16:creationId xmlns:a16="http://schemas.microsoft.com/office/drawing/2014/main" id="{D0712110-0BC1-4B31-B3BB-63B44222E87F}"/>
+              </a:ext>
+            </a:extLst>
+          </p:cNvPr>
+          <p:cNvSpPr>
+            <a:spLocks noGrp="1" noRot="1" noChangeAspect="1" noMove="1" noResize="1" noEditPoints="1" noAdjustHandles="1" noChangeArrowheads="1" noChangeShapeType="1" noTextEdit="1"/>
+          </p:cNvSpPr>
+          <p:nvPr>
+            <p:extLst>
+              <p:ext uri="{386F3935-93C4-4BCD-93E2-E3B085C9AB24}">
+                <p16:designElem xmlns:p16="http://schemas.microsoft.com/office/powerpoint/2015/main" val="1"/>
+              </p:ext>
+            </p:extLst>
+          </p:nvPr>
+        </p:nvSpPr>
+        <p:spPr>
+          <a:xfrm>
+            <a:off x="2" y="0"/>
+            <a:ext cx="12191695" cy="6858000"/>
+          </a:xfrm>
+          <a:prstGeom prst="rect">
+            <a:avLst/>
+          </a:prstGeom>
+          <a:ln>
+            <a:noFill/>
+          </a:ln>
+        </p:spPr>
+        <p:style>
+          <a:lnRef idx="2">
+            <a:schemeClr val="accent1">
+              <a:shade val="50000"/>
+            </a:schemeClr>
+          </a:lnRef>
+          <a:fillRef idx="1">
+            <a:schemeClr val="accent1"/>
+          </a:fillRef>
+          <a:effectRef idx="0">
+            <a:schemeClr val="accent1"/>
+          </a:effectRef>
+          <a:fontRef idx="minor">
+            <a:schemeClr val="lt1"/>
+          </a:fontRef>
+        </p:style>
+        <p:txBody>
+          <a:bodyPr rtlCol="0" anchor="ctr"/>
+          <a:lstStyle/>
+          <a:p>
+            <a:pPr algn="ctr"/>
+            <a:endParaRPr lang="en-US"/>
+          </a:p>
+        </p:txBody>
+      </p:sp>
+      <p:sp>
+        <p:nvSpPr>
+          <p:cNvPr id="20" name="Rectangle 19">
+            <a:extLst>
+              <a:ext uri="{FF2B5EF4-FFF2-40B4-BE49-F238E27FC236}">
+                <a16:creationId xmlns:a16="http://schemas.microsoft.com/office/drawing/2014/main" id="{4466B5F3-C053-4580-B04A-1EF949888280}"/>
+              </a:ext>
+            </a:extLst>
+          </p:cNvPr>
+          <p:cNvSpPr>
+            <a:spLocks noGrp="1" noRot="1" noChangeAspect="1" noMove="1" noResize="1" noEditPoints="1" noAdjustHandles="1" noChangeArrowheads="1" noChangeShapeType="1" noTextEdit="1"/>
+          </p:cNvSpPr>
+          <p:nvPr>
+            <p:extLst>
+              <p:ext uri="{386F3935-93C4-4BCD-93E2-E3B085C9AB24}">
+                <p16:designElem xmlns:p16="http://schemas.microsoft.com/office/powerpoint/2015/main" val="1"/>
+              </p:ext>
+            </p:extLst>
+          </p:nvPr>
+        </p:nvSpPr>
+        <p:spPr>
+          <a:xfrm>
+            <a:off x="0" y="2019476"/>
+            <a:ext cx="12192000" cy="4105941"/>
+          </a:xfrm>
+          <a:prstGeom prst="rect">
+            <a:avLst/>
+          </a:prstGeom>
+          <a:gradFill flip="none" rotWithShape="1">
+            <a:gsLst>
+              <a:gs pos="0">
+                <a:schemeClr val="bg2">
+                  <a:alpha val="0"/>
+                </a:schemeClr>
+              </a:gs>
+              <a:gs pos="100000">
+                <a:schemeClr val="bg2"/>
+              </a:gs>
+            </a:gsLst>
+            <a:lin ang="5400000" scaled="0"/>
+            <a:tileRect/>
+          </a:gradFill>
+          <a:ln>
+            <a:noFill/>
+          </a:ln>
+        </p:spPr>
+        <p:style>
+          <a:lnRef idx="2">
+            <a:schemeClr val="accent1">
+              <a:shade val="50000"/>
+            </a:schemeClr>
+          </a:lnRef>
+          <a:fillRef idx="1">
+            <a:schemeClr val="accent1"/>
+          </a:fillRef>
+          <a:effectRef idx="0">
+            <a:schemeClr val="accent1"/>
+          </a:effectRef>
+          <a:fontRef idx="minor">
+            <a:schemeClr val="lt1"/>
+          </a:fontRef>
+        </p:style>
+        <p:txBody>
+          <a:bodyPr rtlCol="0" anchor="ctr"/>
+          <a:lstStyle/>
+          <a:p>
+            <a:pPr lvl="0" algn="ctr"/>
+            <a:endParaRPr lang="en-US"/>
+          </a:p>
+        </p:txBody>
+      </p:sp>
+      <p:pic>
+        <p:nvPicPr>
+          <p:cNvPr id="22" name="Picture 21">
+            <a:extLst>
+              <a:ext uri="{FF2B5EF4-FFF2-40B4-BE49-F238E27FC236}">
+                <a16:creationId xmlns:a16="http://schemas.microsoft.com/office/drawing/2014/main" id="{25CED634-E2D0-4AB7-96DD-816C9B52C5CF}"/>
+              </a:ext>
+            </a:extLst>
+          </p:cNvPr>
+          <p:cNvPicPr>
+            <a:picLocks noGrp="1" noRot="1" noChangeAspect="1" noMove="1" noResize="1" noEditPoints="1" noAdjustHandles="1" noChangeArrowheads="1" noChangeShapeType="1" noCrop="1"/>
+          </p:cNvPicPr>
+          <p:nvPr>
+            <p:extLst>
+              <p:ext uri="{386F3935-93C4-4BCD-93E2-E3B085C9AB24}">
+                <p16:designElem xmlns:p16="http://schemas.microsoft.com/office/powerpoint/2015/main" val="1"/>
+              </p:ext>
+            </p:extLst>
+          </p:nvPr>
+        </p:nvPicPr>
+        <p:blipFill rotWithShape="1">
+          <a:blip r:embed="rId2">
+            <a:extLst>
+              <a:ext uri="{28A0092B-C50C-407E-A947-70E740481C1C}">
+                <a14:useLocalDpi xmlns:a14="http://schemas.microsoft.com/office/drawing/2010/main" val="0"/>
+              </a:ext>
+            </a:extLst>
+          </a:blip>
+          <a:srcRect t="1538" b="-1538"/>
+          <a:stretch/>
+        </p:blipFill>
+        <p:spPr bwMode="black">
+          <a:xfrm>
+            <a:off x="0" y="6126480"/>
+            <a:ext cx="12192000" cy="742950"/>
+          </a:xfrm>
+          <a:prstGeom prst="rect">
+            <a:avLst/>
+          </a:prstGeom>
+        </p:spPr>
+      </p:pic>
+      <p:cxnSp>
+        <p:nvCxnSpPr>
+          <p:cNvPr id="24" name="Straight Connector 23">
+            <a:extLst>
+              <a:ext uri="{FF2B5EF4-FFF2-40B4-BE49-F238E27FC236}">
+                <a16:creationId xmlns:a16="http://schemas.microsoft.com/office/drawing/2014/main" id="{FCDDCDFB-696D-4FDF-9B58-24F71B7C37BC}"/>
+              </a:ext>
+            </a:extLst>
+          </p:cNvPr>
+          <p:cNvCxnSpPr>
+            <a:cxnSpLocks noGrp="1" noRot="1" noChangeAspect="1" noMove="1" noResize="1" noEditPoints="1" noAdjustHandles="1" noChangeArrowheads="1" noChangeShapeType="1"/>
+          </p:cNvCxnSpPr>
+          <p:nvPr>
+            <p:extLst>
+              <p:ext uri="{386F3935-93C4-4BCD-93E2-E3B085C9AB24}">
+                <p16:designElem xmlns:p16="http://schemas.microsoft.com/office/powerpoint/2015/main" val="1"/>
+              </p:ext>
+            </p:extLst>
+          </p:nvPr>
+        </p:nvCxnSpPr>
+        <p:spPr>
+          <a:xfrm>
+            <a:off x="0" y="6128413"/>
+            <a:ext cx="12192000" cy="0"/>
+          </a:xfrm>
+          <a:prstGeom prst="line">
+            <a:avLst/>
+          </a:prstGeom>
+          <a:ln w="12700">
+            <a:solidFill>
+              <a:srgbClr val="000001">
+                <a:alpha val="20000"/>
+              </a:srgbClr>
+            </a:solidFill>
+          </a:ln>
+        </p:spPr>
+        <p:style>
+          <a:lnRef idx="1">
+            <a:schemeClr val="accent1"/>
+          </a:lnRef>
+          <a:fillRef idx="0">
+            <a:schemeClr val="accent1"/>
+          </a:fillRef>
+          <a:effectRef idx="0">
+            <a:schemeClr val="accent1"/>
+          </a:effectRef>
+          <a:fontRef idx="minor">
+            <a:schemeClr val="tx1"/>
+          </a:fontRef>
+        </p:style>
+      </p:cxnSp>
+      <p:cxnSp>
+        <p:nvCxnSpPr>
+          <p:cNvPr id="26" name="Straight Connector 25">
+            <a:extLst>
+              <a:ext uri="{FF2B5EF4-FFF2-40B4-BE49-F238E27FC236}">
+                <a16:creationId xmlns:a16="http://schemas.microsoft.com/office/drawing/2014/main" id="{FA6123F2-4B61-414F-A7E5-5B7828EACAE2}"/>
+              </a:ext>
+            </a:extLst>
+          </p:cNvPr>
+          <p:cNvCxnSpPr>
+            <a:cxnSpLocks noGrp="1" noRot="1" noChangeAspect="1" noMove="1" noResize="1" noEditPoints="1" noAdjustHandles="1" noChangeArrowheads="1" noChangeShapeType="1"/>
+          </p:cNvCxnSpPr>
+          <p:nvPr>
+            <p:extLst>
+              <p:ext uri="{386F3935-93C4-4BCD-93E2-E3B085C9AB24}">
+                <p16:designElem xmlns:p16="http://schemas.microsoft.com/office/powerpoint/2015/main" val="1"/>
+              </p:ext>
+            </p:extLst>
+          </p:nvPr>
+        </p:nvCxnSpPr>
+        <p:spPr>
+          <a:xfrm>
+            <a:off x="1452617" y="3528543"/>
+            <a:ext cx="4171479" cy="0"/>
+          </a:xfrm>
+          <a:prstGeom prst="line">
+            <a:avLst/>
+          </a:prstGeom>
+          <a:ln w="31750"/>
+        </p:spPr>
+        <p:style>
+          <a:lnRef idx="3">
+            <a:schemeClr val="accent1"/>
+          </a:lnRef>
+          <a:fillRef idx="0">
+            <a:schemeClr val="accent1"/>
+          </a:fillRef>
+          <a:effectRef idx="2">
+            <a:schemeClr val="accent1"/>
+          </a:effectRef>
+          <a:fontRef idx="minor">
+            <a:schemeClr val="tx1"/>
+          </a:fontRef>
+        </p:style>
+      </p:cxnSp>
+      <p:pic>
+        <p:nvPicPr>
+          <p:cNvPr id="5" name="Content Placeholder 4">
+            <a:extLst>
+              <a:ext uri="{FF2B5EF4-FFF2-40B4-BE49-F238E27FC236}">
+                <a16:creationId xmlns:a16="http://schemas.microsoft.com/office/drawing/2014/main" id="{C487F80B-E43B-E541-B332-E0CA5BB1FD42}"/>
+              </a:ext>
+            </a:extLst>
+          </p:cNvPr>
+          <p:cNvPicPr>
+            <a:picLocks noGrp="1" noChangeAspect="1"/>
+          </p:cNvPicPr>
+          <p:nvPr>
+            <p:ph idx="1"/>
+          </p:nvPr>
+        </p:nvPicPr>
+        <p:blipFill>
+          <a:blip r:embed="rId3"/>
+          <a:stretch>
+            <a:fillRect/>
+          </a:stretch>
+        </p:blipFill>
+        <p:spPr>
+          <a:xfrm>
+            <a:off x="5955957" y="469557"/>
+            <a:ext cx="6064058" cy="5338118"/>
+          </a:xfrm>
+          <a:prstGeom prst="rect">
+            <a:avLst/>
+          </a:prstGeom>
+        </p:spPr>
+      </p:pic>
+      <p:sp>
+        <p:nvSpPr>
+          <p:cNvPr id="2" name="Title 1">
+            <a:extLst>
+              <a:ext uri="{FF2B5EF4-FFF2-40B4-BE49-F238E27FC236}">
+                <a16:creationId xmlns:a16="http://schemas.microsoft.com/office/drawing/2014/main" id="{78754D18-E9CB-9046-A51D-CFB828777E29}"/>
+              </a:ext>
+            </a:extLst>
+          </p:cNvPr>
+          <p:cNvSpPr>
+            <a:spLocks noGrp="1"/>
+          </p:cNvSpPr>
+          <p:nvPr>
+            <p:ph type="title"/>
+          </p:nvPr>
+        </p:nvSpPr>
+        <p:spPr>
+          <a:xfrm>
+            <a:off x="1452616" y="962902"/>
+            <a:ext cx="4176384" cy="2380828"/>
+          </a:xfrm>
+        </p:spPr>
+        <p:txBody>
+          <a:bodyPr vert="horz" lIns="91440" tIns="45720" rIns="91440" bIns="0" rtlCol="0" anchor="b">
+            <a:normAutofit/>
+          </a:bodyPr>
+          <a:lstStyle/>
+          <a:p>
+            <a:r>
+              <a:rPr lang="en-US" sz="4800"/>
+              <a:t>DFD LEVEL 1 </a:t>
+            </a:r>
+          </a:p>
+        </p:txBody>
+      </p:sp>
+    </p:spTree>
+    <p:extLst>
+      <p:ext uri="{BB962C8B-B14F-4D97-AF65-F5344CB8AC3E}">
+        <p14:creationId xmlns:p14="http://schemas.microsoft.com/office/powerpoint/2010/main" val="378883978"/>
+      </p:ext>
+    </p:extLst>
+  </p:cSld>
+  <p:clrMapOvr>
+    <a:masterClrMapping/>
+  </p:clrMapOvr>
+</p:sld>
+</file>
+
 <file path=ppt/theme/theme1.xml><?xml version="1.0" encoding="utf-8"?>
 <a:theme xmlns:a="http://schemas.openxmlformats.org/drawingml/2006/main" name="Gallery">
   <a:themeElements>

</xml_diff>